<commit_message>
Updated sessions 3 & 4
</commit_message>
<xml_diff>
--- a/Session 3/Session3.pptx
+++ b/Session 3/Session3.pptx
@@ -32,12 +32,6 @@
     <p:sldId id="277" r:id="rId29"/>
     <p:sldId id="278" r:id="rId30"/>
     <p:sldId id="279" r:id="rId31"/>
-    <p:sldId id="280" r:id="rId32"/>
-    <p:sldId id="281" r:id="rId33"/>
-    <p:sldId id="282" r:id="rId34"/>
-    <p:sldId id="283" r:id="rId35"/>
-    <p:sldId id="284" r:id="rId36"/>
-    <p:sldId id="285" r:id="rId37"/>
   </p:sldIdLst>
   <p:sldSz cx="13004800" cy="9753600"/>
   <p:notesSz cx="6858000" cy="9144000"/>
@@ -5965,8 +5959,8 @@
         </p:nvSpPr>
         <p:spPr>
           <a:xfrm>
-            <a:off x="406400" y="1536700"/>
-            <a:ext cx="12192000" cy="1169260"/>
+            <a:off x="2471955" y="4038600"/>
+            <a:ext cx="8060889" cy="4521200"/>
           </a:xfrm>
           <a:prstGeom prst="rect">
             <a:avLst/>
@@ -5974,74 +5968,11 @@
         </p:spPr>
         <p:txBody>
           <a:bodyPr/>
-          <a:lstStyle>
-            <a:lvl1pPr defTabSz="403097">
-              <a:spcBef>
-                <a:spcPts val="1900"/>
-              </a:spcBef>
-              <a:defRPr sz="8280"/>
-            </a:lvl1pPr>
-          </a:lstStyle>
-          <a:p>
-            <a:pPr/>
-            <a:r>
-              <a:t>Group by statements</a:t>
-            </a:r>
-          </a:p>
-        </p:txBody>
-      </p:sp>
-      <p:sp>
-        <p:nvSpPr>
-          <p:cNvPr id="239" name="Shape 239"/>
-          <p:cNvSpPr/>
-          <p:nvPr/>
-        </p:nvSpPr>
-        <p:spPr>
-          <a:xfrm>
-            <a:off x="462014" y="4154175"/>
-            <a:ext cx="11795102" cy="2057401"/>
-          </a:xfrm>
-          <a:prstGeom prst="rect">
-            <a:avLst/>
-          </a:prstGeom>
-          <a:ln w="12700">
-            <a:miter lim="400000"/>
-          </a:ln>
-          <a:extLst>
-            <a:ext uri="{C572A759-6A51-4108-AA02-DFA0A04FC94B}">
-              <ma14:wrappingTextBoxFlag xmlns:ma14="http://schemas.microsoft.com/office/mac/drawingml/2011/main" val="1"/>
-            </a:ext>
-          </a:extLst>
-        </p:spPr>
-        <p:txBody>
-          <a:bodyPr lIns="50800" tIns="50800" rIns="50800" bIns="50800" anchor="ctr">
-            <a:spAutoFit/>
-          </a:bodyPr>
           <a:lstStyle/>
           <a:p>
-            <a:pPr>
-              <a:defRPr sz="5400">
-                <a:latin typeface="Anonymous Pro for Powerline"/>
-                <a:ea typeface="Anonymous Pro for Powerline"/>
-                <a:cs typeface="Anonymous Pro for Powerline"/>
-                <a:sym typeface="Anonymous Pro for Powerline"/>
-              </a:defRPr>
-            </a:pPr>
-            <a:r>
-              <a:t>SELECT COUNT(*)</a:t>
-            </a:r>
-          </a:p>
-          <a:p>
-            <a:pPr>
-              <a:defRPr sz="5400">
-                <a:latin typeface="Anonymous Pro for Powerline"/>
-                <a:ea typeface="Anonymous Pro for Powerline"/>
-                <a:cs typeface="Anonymous Pro for Powerline"/>
-                <a:sym typeface="Anonymous Pro for Powerline"/>
-              </a:defRPr>
-            </a:pPr>
-            <a:r>
-              <a:t>FROM purchases GROUP BY user_id</a:t>
+            <a:pPr/>
+            <a:r>
+              <a:t>Exercises</a:t>
             </a:r>
           </a:p>
         </p:txBody>
@@ -6074,7 +6005,7 @@
       </p:grpSpPr>
       <p:sp>
         <p:nvSpPr>
-          <p:cNvPr id="241" name="Shape 241"/>
+          <p:cNvPr id="240" name="Shape 240"/>
           <p:cNvSpPr/>
           <p:nvPr>
             <p:ph type="title"/>
@@ -6082,8 +6013,8 @@
         </p:nvSpPr>
         <p:spPr>
           <a:xfrm>
-            <a:off x="2471955" y="4038600"/>
-            <a:ext cx="8060889" cy="4521200"/>
+            <a:off x="2802102" y="4038600"/>
+            <a:ext cx="7400596" cy="4521200"/>
           </a:xfrm>
           <a:prstGeom prst="rect">
             <a:avLst/>
@@ -6095,7 +6026,7 @@
           <a:p>
             <a:pPr/>
             <a:r>
-              <a:t>Exercises</a:t>
+              <a:t>Group by</a:t>
             </a:r>
           </a:p>
         </p:txBody>
@@ -6128,7 +6059,7 @@
       </p:grpSpPr>
       <p:sp>
         <p:nvSpPr>
-          <p:cNvPr id="243" name="Shape 243"/>
+          <p:cNvPr id="242" name="Shape 242"/>
           <p:cNvSpPr/>
           <p:nvPr>
             <p:ph type="title"/>
@@ -6136,8 +6067,8 @@
         </p:nvSpPr>
         <p:spPr>
           <a:xfrm>
-            <a:off x="2182379" y="4038600"/>
-            <a:ext cx="8640042" cy="4521200"/>
+            <a:off x="406400" y="1536700"/>
+            <a:ext cx="12192000" cy="1169260"/>
           </a:xfrm>
           <a:prstGeom prst="rect">
             <a:avLst/>
@@ -6145,11 +6076,74 @@
         </p:spPr>
         <p:txBody>
           <a:bodyPr/>
+          <a:lstStyle>
+            <a:lvl1pPr defTabSz="403097">
+              <a:spcBef>
+                <a:spcPts val="1900"/>
+              </a:spcBef>
+              <a:defRPr sz="8280"/>
+            </a:lvl1pPr>
+          </a:lstStyle>
+          <a:p>
+            <a:pPr/>
+            <a:r>
+              <a:t>Group by statements</a:t>
+            </a:r>
+          </a:p>
+        </p:txBody>
+      </p:sp>
+      <p:sp>
+        <p:nvSpPr>
+          <p:cNvPr id="243" name="Shape 243"/>
+          <p:cNvSpPr/>
+          <p:nvPr/>
+        </p:nvSpPr>
+        <p:spPr>
+          <a:xfrm>
+            <a:off x="462014" y="4154175"/>
+            <a:ext cx="11795102" cy="2057401"/>
+          </a:xfrm>
+          <a:prstGeom prst="rect">
+            <a:avLst/>
+          </a:prstGeom>
+          <a:ln w="12700">
+            <a:miter lim="400000"/>
+          </a:ln>
+          <a:extLst>
+            <a:ext uri="{C572A759-6A51-4108-AA02-DFA0A04FC94B}">
+              <ma14:wrappingTextBoxFlag xmlns:ma14="http://schemas.microsoft.com/office/mac/drawingml/2011/main" val="1"/>
+            </a:ext>
+          </a:extLst>
+        </p:spPr>
+        <p:txBody>
+          <a:bodyPr lIns="50800" tIns="50800" rIns="50800" bIns="50800" anchor="ctr">
+            <a:spAutoFit/>
+          </a:bodyPr>
           <a:lstStyle/>
           <a:p>
-            <a:pPr/>
-            <a:r>
-              <a:t>Subqueries</a:t>
+            <a:pPr>
+              <a:defRPr sz="5400">
+                <a:latin typeface="Anonymous Pro for Powerline"/>
+                <a:ea typeface="Anonymous Pro for Powerline"/>
+                <a:cs typeface="Anonymous Pro for Powerline"/>
+                <a:sym typeface="Anonymous Pro for Powerline"/>
+              </a:defRPr>
+            </a:pPr>
+            <a:r>
+              <a:t>SELECT key, SUM(data)</a:t>
+            </a:r>
+          </a:p>
+          <a:p>
+            <a:pPr>
+              <a:defRPr sz="5400">
+                <a:latin typeface="Anonymous Pro for Powerline"/>
+                <a:ea typeface="Anonymous Pro for Powerline"/>
+                <a:cs typeface="Anonymous Pro for Powerline"/>
+                <a:sym typeface="Anonymous Pro for Powerline"/>
+              </a:defRPr>
+            </a:pPr>
+            <a:r>
+              <a:t>FROM table GROUP BY key;</a:t>
             </a:r>
           </a:p>
         </p:txBody>
@@ -6190,8 +6184,8 @@
         </p:nvSpPr>
         <p:spPr>
           <a:xfrm>
-            <a:off x="406400" y="1651000"/>
-            <a:ext cx="12192000" cy="1574205"/>
+            <a:off x="406400" y="1536700"/>
+            <a:ext cx="12192000" cy="1169260"/>
           </a:xfrm>
           <a:prstGeom prst="rect">
             <a:avLst/>
@@ -6200,14 +6194,17 @@
         <p:txBody>
           <a:bodyPr/>
           <a:lstStyle>
-            <a:lvl1pPr>
-              <a:defRPr sz="8000"/>
+            <a:lvl1pPr defTabSz="403097">
+              <a:spcBef>
+                <a:spcPts val="1900"/>
+              </a:spcBef>
+              <a:defRPr sz="8280"/>
             </a:lvl1pPr>
           </a:lstStyle>
           <a:p>
             <a:pPr/>
             <a:r>
-              <a:t>Subqueries</a:t>
+              <a:t>2 step process</a:t>
             </a:r>
           </a:p>
         </p:txBody>
@@ -6222,8 +6219,8 @@
         </p:nvSpPr>
         <p:spPr>
           <a:xfrm>
-            <a:off x="406400" y="3953767"/>
-            <a:ext cx="12192000" cy="6108378"/>
+            <a:off x="406400" y="2812441"/>
+            <a:ext cx="12192000" cy="6510182"/>
           </a:xfrm>
           <a:prstGeom prst="rect">
             <a:avLst/>
@@ -6243,7 +6240,7 @@
               <a:defRPr sz="6400"/>
             </a:pPr>
             <a:r>
-              <a:t>Inner query evaluated first</a:t>
+              <a:t>Gather rows with same value in GROUP BY column </a:t>
             </a:r>
           </a:p>
           <a:p>
@@ -6257,7 +6254,7 @@
               <a:defRPr sz="6400"/>
             </a:pPr>
             <a:r>
-              <a:t>Substitutes in one or multiple values</a:t>
+              <a:t>Combine each collection of rows with an AGGREGATION function</a:t>
             </a:r>
           </a:p>
         </p:txBody>
@@ -6274,6 +6271,11 @@
 <file path=ppt/slides/slide16.xml><?xml version="1.0" encoding="utf-8"?>
 <p:sld xmlns:a="http://schemas.openxmlformats.org/drawingml/2006/main" xmlns:r="http://schemas.openxmlformats.org/officeDocument/2006/relationships" xmlns:p="http://schemas.openxmlformats.org/presentationml/2006/main" showMasterSp="1" showMasterPhAnim="1">
   <p:cSld>
+    <p:bg>
+      <p:bgPr>
+        <a:noFill/>
+      </p:bgPr>
+    </p:bg>
     <p:spTree>
       <p:nvGrpSpPr>
         <p:cNvPr id="1" name=""/>
@@ -6288,38 +6290,35 @@
           <a:chExt cx="0" cy="0"/>
         </a:xfrm>
       </p:grpSpPr>
-      <p:sp>
-        <p:nvSpPr>
-          <p:cNvPr id="248" name="Shape 248"/>
-          <p:cNvSpPr/>
-          <p:nvPr>
-            <p:ph type="title"/>
-          </p:nvPr>
-        </p:nvSpPr>
-        <p:spPr>
-          <a:xfrm>
-            <a:off x="406400" y="1651000"/>
-            <a:ext cx="12192000" cy="1574205"/>
-          </a:xfrm>
-          <a:prstGeom prst="rect">
-            <a:avLst/>
-          </a:prstGeom>
-        </p:spPr>
-        <p:txBody>
-          <a:bodyPr/>
-          <a:lstStyle>
-            <a:lvl1pPr>
-              <a:defRPr sz="8000"/>
-            </a:lvl1pPr>
-          </a:lstStyle>
-          <a:p>
-            <a:pPr/>
-            <a:r>
-              <a:t>Single Value subquery</a:t>
-            </a:r>
-          </a:p>
-        </p:txBody>
-      </p:sp>
+      <p:pic>
+        <p:nvPicPr>
+          <p:cNvPr id="248" name="pasted-image.tiff"/>
+          <p:cNvPicPr>
+            <a:picLocks noChangeAspect="1"/>
+          </p:cNvPicPr>
+          <p:nvPr/>
+        </p:nvPicPr>
+        <p:blipFill>
+          <a:blip r:embed="rId2">
+            <a:extLst/>
+          </a:blip>
+          <a:stretch>
+            <a:fillRect/>
+          </a:stretch>
+        </p:blipFill>
+        <p:spPr>
+          <a:xfrm>
+            <a:off x="-17945" y="5541"/>
+            <a:ext cx="13040690" cy="9780518"/>
+          </a:xfrm>
+          <a:prstGeom prst="rect">
+            <a:avLst/>
+          </a:prstGeom>
+          <a:ln w="12700">
+            <a:miter lim="400000"/>
+          </a:ln>
+        </p:spPr>
+      </p:pic>
       <p:sp>
         <p:nvSpPr>
           <p:cNvPr id="249" name="Shape 249"/>
@@ -6328,12 +6327,19 @@
         </p:nvSpPr>
         <p:spPr>
           <a:xfrm>
-            <a:off x="604849" y="3716370"/>
-            <a:ext cx="12445512" cy="3708401"/>
-          </a:xfrm>
-          <a:prstGeom prst="rect">
-            <a:avLst/>
-          </a:prstGeom>
+            <a:off x="1308140" y="3128238"/>
+            <a:ext cx="578893" cy="558801"/>
+          </a:xfrm>
+          <a:prstGeom prst="rect">
+            <a:avLst/>
+          </a:prstGeom>
+          <a:solidFill>
+            <a:schemeClr val="accent3">
+              <a:hueOff val="-1187647"/>
+              <a:satOff val="22407"/>
+              <a:lumOff val="18627"/>
+            </a:schemeClr>
+          </a:solidFill>
           <a:ln w="12700">
             <a:miter lim="400000"/>
           </a:ln>
@@ -6344,45 +6350,1489 @@
           </a:extLst>
         </p:spPr>
         <p:txBody>
-          <a:bodyPr lIns="50800" tIns="50800" rIns="50800" bIns="50800" anchor="ctr">
+          <a:bodyPr wrap="none" lIns="50800" tIns="50800" rIns="50800" bIns="50800" anchor="ctr">
+            <a:spAutoFit/>
+          </a:bodyPr>
+          <a:lstStyle>
+            <a:lvl1pPr>
+              <a:defRPr sz="2600">
+                <a:solidFill>
+                  <a:srgbClr val="000000"/>
+                </a:solidFill>
+              </a:defRPr>
+            </a:lvl1pPr>
+          </a:lstStyle>
+          <a:p>
+            <a:pPr/>
+            <a:r>
+              <a:t>CA</a:t>
+            </a:r>
+          </a:p>
+        </p:txBody>
+      </p:sp>
+      <p:sp>
+        <p:nvSpPr>
+          <p:cNvPr id="250" name="Shape 250"/>
+          <p:cNvSpPr/>
+          <p:nvPr/>
+        </p:nvSpPr>
+        <p:spPr>
+          <a:xfrm>
+            <a:off x="1308140" y="5377360"/>
+            <a:ext cx="578893" cy="558801"/>
+          </a:xfrm>
+          <a:prstGeom prst="rect">
+            <a:avLst/>
+          </a:prstGeom>
+          <a:solidFill>
+            <a:schemeClr val="accent3">
+              <a:hueOff val="-1187647"/>
+              <a:satOff val="22407"/>
+              <a:lumOff val="18627"/>
+            </a:schemeClr>
+          </a:solidFill>
+          <a:ln w="12700">
+            <a:miter lim="400000"/>
+          </a:ln>
+          <a:extLst>
+            <a:ext uri="{C572A759-6A51-4108-AA02-DFA0A04FC94B}">
+              <ma14:wrappingTextBoxFlag xmlns:ma14="http://schemas.microsoft.com/office/mac/drawingml/2011/main" val="1"/>
+            </a:ext>
+          </a:extLst>
+        </p:spPr>
+        <p:txBody>
+          <a:bodyPr wrap="none" lIns="50800" tIns="50800" rIns="50800" bIns="50800" anchor="ctr">
+            <a:spAutoFit/>
+          </a:bodyPr>
+          <a:lstStyle>
+            <a:lvl1pPr>
+              <a:defRPr sz="2600">
+                <a:solidFill>
+                  <a:srgbClr val="000000"/>
+                </a:solidFill>
+              </a:defRPr>
+            </a:lvl1pPr>
+          </a:lstStyle>
+          <a:p>
+            <a:pPr/>
+            <a:r>
+              <a:t>CA</a:t>
+            </a:r>
+          </a:p>
+        </p:txBody>
+      </p:sp>
+      <p:sp>
+        <p:nvSpPr>
+          <p:cNvPr id="251" name="Shape 251"/>
+          <p:cNvSpPr/>
+          <p:nvPr/>
+        </p:nvSpPr>
+        <p:spPr>
+          <a:xfrm>
+            <a:off x="1308140" y="3846984"/>
+            <a:ext cx="597384" cy="558801"/>
+          </a:xfrm>
+          <a:prstGeom prst="rect">
+            <a:avLst/>
+          </a:prstGeom>
+          <a:solidFill>
+            <a:schemeClr val="accent1">
+              <a:hueOff val="-84091"/>
+              <a:satOff val="15316"/>
+              <a:lumOff val="24313"/>
+            </a:schemeClr>
+          </a:solidFill>
+          <a:ln w="12700">
+            <a:miter lim="400000"/>
+          </a:ln>
+          <a:extLst>
+            <a:ext uri="{C572A759-6A51-4108-AA02-DFA0A04FC94B}">
+              <ma14:wrappingTextBoxFlag xmlns:ma14="http://schemas.microsoft.com/office/mac/drawingml/2011/main" val="1"/>
+            </a:ext>
+          </a:extLst>
+        </p:spPr>
+        <p:txBody>
+          <a:bodyPr wrap="none" lIns="50800" tIns="50800" rIns="50800" bIns="50800" anchor="ctr">
+            <a:spAutoFit/>
+          </a:bodyPr>
+          <a:lstStyle>
+            <a:lvl1pPr>
+              <a:defRPr sz="2600">
+                <a:solidFill>
+                  <a:srgbClr val="000000"/>
+                </a:solidFill>
+              </a:defRPr>
+            </a:lvl1pPr>
+          </a:lstStyle>
+          <a:p>
+            <a:pPr/>
+            <a:r>
+              <a:t>OR</a:t>
+            </a:r>
+          </a:p>
+        </p:txBody>
+      </p:sp>
+      <p:sp>
+        <p:nvSpPr>
+          <p:cNvPr id="252" name="Shape 252"/>
+          <p:cNvSpPr/>
+          <p:nvPr/>
+        </p:nvSpPr>
+        <p:spPr>
+          <a:xfrm>
+            <a:off x="1317386" y="6132346"/>
+            <a:ext cx="597384" cy="558801"/>
+          </a:xfrm>
+          <a:prstGeom prst="rect">
+            <a:avLst/>
+          </a:prstGeom>
+          <a:solidFill>
+            <a:schemeClr val="accent1">
+              <a:hueOff val="-84091"/>
+              <a:satOff val="15316"/>
+              <a:lumOff val="24313"/>
+            </a:schemeClr>
+          </a:solidFill>
+          <a:ln w="12700">
+            <a:miter lim="400000"/>
+          </a:ln>
+          <a:extLst>
+            <a:ext uri="{C572A759-6A51-4108-AA02-DFA0A04FC94B}">
+              <ma14:wrappingTextBoxFlag xmlns:ma14="http://schemas.microsoft.com/office/mac/drawingml/2011/main" val="1"/>
+            </a:ext>
+          </a:extLst>
+        </p:spPr>
+        <p:txBody>
+          <a:bodyPr wrap="none" lIns="50800" tIns="50800" rIns="50800" bIns="50800" anchor="ctr">
+            <a:spAutoFit/>
+          </a:bodyPr>
+          <a:lstStyle>
+            <a:lvl1pPr>
+              <a:defRPr sz="2600">
+                <a:solidFill>
+                  <a:srgbClr val="000000"/>
+                </a:solidFill>
+              </a:defRPr>
+            </a:lvl1pPr>
+          </a:lstStyle>
+          <a:p>
+            <a:pPr/>
+            <a:r>
+              <a:t>OR</a:t>
+            </a:r>
+          </a:p>
+        </p:txBody>
+      </p:sp>
+      <p:sp>
+        <p:nvSpPr>
+          <p:cNvPr id="253" name="Shape 253"/>
+          <p:cNvSpPr/>
+          <p:nvPr/>
+        </p:nvSpPr>
+        <p:spPr>
+          <a:xfrm>
+            <a:off x="1271158" y="4622374"/>
+            <a:ext cx="671348" cy="558801"/>
+          </a:xfrm>
+          <a:prstGeom prst="rect">
+            <a:avLst/>
+          </a:prstGeom>
+          <a:solidFill>
+            <a:schemeClr val="accent4"/>
+          </a:solidFill>
+          <a:ln w="12700">
+            <a:miter lim="400000"/>
+          </a:ln>
+          <a:extLst>
+            <a:ext uri="{C572A759-6A51-4108-AA02-DFA0A04FC94B}">
+              <ma14:wrappingTextBoxFlag xmlns:ma14="http://schemas.microsoft.com/office/mac/drawingml/2011/main" val="1"/>
+            </a:ext>
+          </a:extLst>
+        </p:spPr>
+        <p:txBody>
+          <a:bodyPr wrap="none" lIns="50800" tIns="50800" rIns="50800" bIns="50800" anchor="ctr">
+            <a:spAutoFit/>
+          </a:bodyPr>
+          <a:lstStyle>
+            <a:lvl1pPr>
+              <a:defRPr sz="2600">
+                <a:solidFill>
+                  <a:srgbClr val="000000"/>
+                </a:solidFill>
+              </a:defRPr>
+            </a:lvl1pPr>
+          </a:lstStyle>
+          <a:p>
+            <a:pPr/>
+            <a:r>
+              <a:t>WA</a:t>
+            </a:r>
+          </a:p>
+        </p:txBody>
+      </p:sp>
+      <p:sp>
+        <p:nvSpPr>
+          <p:cNvPr id="254" name="Shape 254"/>
+          <p:cNvSpPr/>
+          <p:nvPr/>
+        </p:nvSpPr>
+        <p:spPr>
+          <a:xfrm>
+            <a:off x="1270040" y="6887332"/>
+            <a:ext cx="671349" cy="558801"/>
+          </a:xfrm>
+          <a:prstGeom prst="rect">
+            <a:avLst/>
+          </a:prstGeom>
+          <a:solidFill>
+            <a:schemeClr val="accent4"/>
+          </a:solidFill>
+          <a:ln w="12700">
+            <a:miter lim="400000"/>
+          </a:ln>
+          <a:extLst>
+            <a:ext uri="{C572A759-6A51-4108-AA02-DFA0A04FC94B}">
+              <ma14:wrappingTextBoxFlag xmlns:ma14="http://schemas.microsoft.com/office/mac/drawingml/2011/main" val="1"/>
+            </a:ext>
+          </a:extLst>
+        </p:spPr>
+        <p:txBody>
+          <a:bodyPr wrap="none" lIns="50800" tIns="50800" rIns="50800" bIns="50800" anchor="ctr">
+            <a:spAutoFit/>
+          </a:bodyPr>
+          <a:lstStyle>
+            <a:lvl1pPr>
+              <a:defRPr sz="2600">
+                <a:solidFill>
+                  <a:srgbClr val="000000"/>
+                </a:solidFill>
+              </a:defRPr>
+            </a:lvl1pPr>
+          </a:lstStyle>
+          <a:p>
+            <a:pPr/>
+            <a:r>
+              <a:t>WA</a:t>
+            </a:r>
+          </a:p>
+        </p:txBody>
+      </p:sp>
+      <p:sp>
+        <p:nvSpPr>
+          <p:cNvPr id="255" name="Shape 255"/>
+          <p:cNvSpPr/>
+          <p:nvPr/>
+        </p:nvSpPr>
+        <p:spPr>
+          <a:xfrm>
+            <a:off x="4353058" y="1612900"/>
+            <a:ext cx="578893" cy="558801"/>
+          </a:xfrm>
+          <a:prstGeom prst="rect">
+            <a:avLst/>
+          </a:prstGeom>
+          <a:solidFill>
+            <a:schemeClr val="accent3">
+              <a:hueOff val="-1187647"/>
+              <a:satOff val="22407"/>
+              <a:lumOff val="18627"/>
+            </a:schemeClr>
+          </a:solidFill>
+          <a:ln w="12700">
+            <a:miter lim="400000"/>
+          </a:ln>
+          <a:extLst>
+            <a:ext uri="{C572A759-6A51-4108-AA02-DFA0A04FC94B}">
+              <ma14:wrappingTextBoxFlag xmlns:ma14="http://schemas.microsoft.com/office/mac/drawingml/2011/main" val="1"/>
+            </a:ext>
+          </a:extLst>
+        </p:spPr>
+        <p:txBody>
+          <a:bodyPr wrap="none" lIns="50800" tIns="50800" rIns="50800" bIns="50800" anchor="ctr">
+            <a:spAutoFit/>
+          </a:bodyPr>
+          <a:lstStyle>
+            <a:lvl1pPr>
+              <a:defRPr sz="2600">
+                <a:solidFill>
+                  <a:srgbClr val="000000"/>
+                </a:solidFill>
+              </a:defRPr>
+            </a:lvl1pPr>
+          </a:lstStyle>
+          <a:p>
+            <a:pPr/>
+            <a:r>
+              <a:t>CA</a:t>
+            </a:r>
+          </a:p>
+        </p:txBody>
+      </p:sp>
+      <p:sp>
+        <p:nvSpPr>
+          <p:cNvPr id="256" name="Shape 256"/>
+          <p:cNvSpPr/>
+          <p:nvPr/>
+        </p:nvSpPr>
+        <p:spPr>
+          <a:xfrm>
+            <a:off x="4353058" y="2398227"/>
+            <a:ext cx="578893" cy="558801"/>
+          </a:xfrm>
+          <a:prstGeom prst="rect">
+            <a:avLst/>
+          </a:prstGeom>
+          <a:solidFill>
+            <a:schemeClr val="accent3">
+              <a:hueOff val="-1187647"/>
+              <a:satOff val="22407"/>
+              <a:lumOff val="18627"/>
+            </a:schemeClr>
+          </a:solidFill>
+          <a:ln w="12700">
+            <a:miter lim="400000"/>
+          </a:ln>
+          <a:extLst>
+            <a:ext uri="{C572A759-6A51-4108-AA02-DFA0A04FC94B}">
+              <ma14:wrappingTextBoxFlag xmlns:ma14="http://schemas.microsoft.com/office/mac/drawingml/2011/main" val="1"/>
+            </a:ext>
+          </a:extLst>
+        </p:spPr>
+        <p:txBody>
+          <a:bodyPr wrap="none" lIns="50800" tIns="50800" rIns="50800" bIns="50800" anchor="ctr">
+            <a:spAutoFit/>
+          </a:bodyPr>
+          <a:lstStyle>
+            <a:lvl1pPr>
+              <a:defRPr sz="2600">
+                <a:solidFill>
+                  <a:srgbClr val="000000"/>
+                </a:solidFill>
+              </a:defRPr>
+            </a:lvl1pPr>
+          </a:lstStyle>
+          <a:p>
+            <a:pPr/>
+            <a:r>
+              <a:t>CA</a:t>
+            </a:r>
+          </a:p>
+        </p:txBody>
+      </p:sp>
+      <p:sp>
+        <p:nvSpPr>
+          <p:cNvPr id="257" name="Shape 257"/>
+          <p:cNvSpPr/>
+          <p:nvPr/>
+        </p:nvSpPr>
+        <p:spPr>
+          <a:xfrm>
+            <a:off x="4331113" y="4622374"/>
+            <a:ext cx="597383" cy="558801"/>
+          </a:xfrm>
+          <a:prstGeom prst="rect">
+            <a:avLst/>
+          </a:prstGeom>
+          <a:solidFill>
+            <a:schemeClr val="accent1">
+              <a:hueOff val="-84091"/>
+              <a:satOff val="15316"/>
+              <a:lumOff val="24313"/>
+            </a:schemeClr>
+          </a:solidFill>
+          <a:ln w="12700">
+            <a:miter lim="400000"/>
+          </a:ln>
+          <a:extLst>
+            <a:ext uri="{C572A759-6A51-4108-AA02-DFA0A04FC94B}">
+              <ma14:wrappingTextBoxFlag xmlns:ma14="http://schemas.microsoft.com/office/mac/drawingml/2011/main" val="1"/>
+            </a:ext>
+          </a:extLst>
+        </p:spPr>
+        <p:txBody>
+          <a:bodyPr wrap="none" lIns="50800" tIns="50800" rIns="50800" bIns="50800" anchor="ctr">
+            <a:spAutoFit/>
+          </a:bodyPr>
+          <a:lstStyle>
+            <a:lvl1pPr>
+              <a:defRPr sz="2600">
+                <a:solidFill>
+                  <a:srgbClr val="000000"/>
+                </a:solidFill>
+              </a:defRPr>
+            </a:lvl1pPr>
+          </a:lstStyle>
+          <a:p>
+            <a:pPr/>
+            <a:r>
+              <a:t>OR</a:t>
+            </a:r>
+          </a:p>
+        </p:txBody>
+      </p:sp>
+      <p:sp>
+        <p:nvSpPr>
+          <p:cNvPr id="258" name="Shape 258"/>
+          <p:cNvSpPr/>
+          <p:nvPr/>
+        </p:nvSpPr>
+        <p:spPr>
+          <a:xfrm>
+            <a:off x="4334088" y="5377360"/>
+            <a:ext cx="597384" cy="558801"/>
+          </a:xfrm>
+          <a:prstGeom prst="rect">
+            <a:avLst/>
+          </a:prstGeom>
+          <a:solidFill>
+            <a:schemeClr val="accent1">
+              <a:hueOff val="-84091"/>
+              <a:satOff val="15316"/>
+              <a:lumOff val="24313"/>
+            </a:schemeClr>
+          </a:solidFill>
+          <a:ln w="12700">
+            <a:miter lim="400000"/>
+          </a:ln>
+          <a:extLst>
+            <a:ext uri="{C572A759-6A51-4108-AA02-DFA0A04FC94B}">
+              <ma14:wrappingTextBoxFlag xmlns:ma14="http://schemas.microsoft.com/office/mac/drawingml/2011/main" val="1"/>
+            </a:ext>
+          </a:extLst>
+        </p:spPr>
+        <p:txBody>
+          <a:bodyPr wrap="none" lIns="50800" tIns="50800" rIns="50800" bIns="50800" anchor="ctr">
+            <a:spAutoFit/>
+          </a:bodyPr>
+          <a:lstStyle>
+            <a:lvl1pPr>
+              <a:defRPr sz="2600">
+                <a:solidFill>
+                  <a:srgbClr val="000000"/>
+                </a:solidFill>
+              </a:defRPr>
+            </a:lvl1pPr>
+          </a:lstStyle>
+          <a:p>
+            <a:pPr/>
+            <a:r>
+              <a:t>OR</a:t>
+            </a:r>
+          </a:p>
+        </p:txBody>
+      </p:sp>
+      <p:sp>
+        <p:nvSpPr>
+          <p:cNvPr id="259" name="Shape 259"/>
+          <p:cNvSpPr/>
+          <p:nvPr/>
+        </p:nvSpPr>
+        <p:spPr>
+          <a:xfrm>
+            <a:off x="4294130" y="7626482"/>
+            <a:ext cx="671349" cy="558801"/>
+          </a:xfrm>
+          <a:prstGeom prst="rect">
+            <a:avLst/>
+          </a:prstGeom>
+          <a:solidFill>
+            <a:schemeClr val="accent4"/>
+          </a:solidFill>
+          <a:ln w="12700">
+            <a:miter lim="400000"/>
+          </a:ln>
+          <a:extLst>
+            <a:ext uri="{C572A759-6A51-4108-AA02-DFA0A04FC94B}">
+              <ma14:wrappingTextBoxFlag xmlns:ma14="http://schemas.microsoft.com/office/mac/drawingml/2011/main" val="1"/>
+            </a:ext>
+          </a:extLst>
+        </p:spPr>
+        <p:txBody>
+          <a:bodyPr wrap="none" lIns="50800" tIns="50800" rIns="50800" bIns="50800" anchor="ctr">
+            <a:spAutoFit/>
+          </a:bodyPr>
+          <a:lstStyle>
+            <a:lvl1pPr>
+              <a:defRPr sz="2600">
+                <a:solidFill>
+                  <a:srgbClr val="000000"/>
+                </a:solidFill>
+              </a:defRPr>
+            </a:lvl1pPr>
+          </a:lstStyle>
+          <a:p>
+            <a:pPr/>
+            <a:r>
+              <a:t>WA</a:t>
+            </a:r>
+          </a:p>
+        </p:txBody>
+      </p:sp>
+      <p:sp>
+        <p:nvSpPr>
+          <p:cNvPr id="260" name="Shape 260"/>
+          <p:cNvSpPr/>
+          <p:nvPr/>
+        </p:nvSpPr>
+        <p:spPr>
+          <a:xfrm>
+            <a:off x="4281430" y="8356493"/>
+            <a:ext cx="671349" cy="558801"/>
+          </a:xfrm>
+          <a:prstGeom prst="rect">
+            <a:avLst/>
+          </a:prstGeom>
+          <a:solidFill>
+            <a:schemeClr val="accent4"/>
+          </a:solidFill>
+          <a:ln w="12700">
+            <a:miter lim="400000"/>
+          </a:ln>
+          <a:extLst>
+            <a:ext uri="{C572A759-6A51-4108-AA02-DFA0A04FC94B}">
+              <ma14:wrappingTextBoxFlag xmlns:ma14="http://schemas.microsoft.com/office/mac/drawingml/2011/main" val="1"/>
+            </a:ext>
+          </a:extLst>
+        </p:spPr>
+        <p:txBody>
+          <a:bodyPr wrap="none" lIns="50800" tIns="50800" rIns="50800" bIns="50800" anchor="ctr">
+            <a:spAutoFit/>
+          </a:bodyPr>
+          <a:lstStyle>
+            <a:lvl1pPr>
+              <a:defRPr sz="2600">
+                <a:solidFill>
+                  <a:srgbClr val="000000"/>
+                </a:solidFill>
+              </a:defRPr>
+            </a:lvl1pPr>
+          </a:lstStyle>
+          <a:p>
+            <a:pPr/>
+            <a:r>
+              <a:t>WA</a:t>
+            </a:r>
+          </a:p>
+        </p:txBody>
+      </p:sp>
+      <p:sp>
+        <p:nvSpPr>
+          <p:cNvPr id="261" name="Shape 261"/>
+          <p:cNvSpPr/>
+          <p:nvPr/>
+        </p:nvSpPr>
+        <p:spPr>
+          <a:xfrm>
+            <a:off x="7336761" y="1984760"/>
+            <a:ext cx="578893" cy="558801"/>
+          </a:xfrm>
+          <a:prstGeom prst="rect">
+            <a:avLst/>
+          </a:prstGeom>
+          <a:solidFill>
+            <a:schemeClr val="accent3">
+              <a:hueOff val="-1187647"/>
+              <a:satOff val="22407"/>
+              <a:lumOff val="18627"/>
+            </a:schemeClr>
+          </a:solidFill>
+          <a:ln w="12700">
+            <a:miter lim="400000"/>
+          </a:ln>
+          <a:extLst>
+            <a:ext uri="{C572A759-6A51-4108-AA02-DFA0A04FC94B}">
+              <ma14:wrappingTextBoxFlag xmlns:ma14="http://schemas.microsoft.com/office/mac/drawingml/2011/main" val="1"/>
+            </a:ext>
+          </a:extLst>
+        </p:spPr>
+        <p:txBody>
+          <a:bodyPr wrap="none" lIns="50800" tIns="50800" rIns="50800" bIns="50800" anchor="ctr">
+            <a:spAutoFit/>
+          </a:bodyPr>
+          <a:lstStyle>
+            <a:lvl1pPr>
+              <a:defRPr sz="2600">
+                <a:solidFill>
+                  <a:srgbClr val="000000"/>
+                </a:solidFill>
+              </a:defRPr>
+            </a:lvl1pPr>
+          </a:lstStyle>
+          <a:p>
+            <a:pPr/>
+            <a:r>
+              <a:t>CA</a:t>
+            </a:r>
+          </a:p>
+        </p:txBody>
+      </p:sp>
+      <p:sp>
+        <p:nvSpPr>
+          <p:cNvPr id="262" name="Shape 262"/>
+          <p:cNvSpPr/>
+          <p:nvPr/>
+        </p:nvSpPr>
+        <p:spPr>
+          <a:xfrm>
+            <a:off x="7317103" y="4994235"/>
+            <a:ext cx="597383" cy="558801"/>
+          </a:xfrm>
+          <a:prstGeom prst="rect">
+            <a:avLst/>
+          </a:prstGeom>
+          <a:solidFill>
+            <a:schemeClr val="accent1">
+              <a:hueOff val="-84091"/>
+              <a:satOff val="15316"/>
+              <a:lumOff val="24313"/>
+            </a:schemeClr>
+          </a:solidFill>
+          <a:ln w="12700">
+            <a:miter lim="400000"/>
+          </a:ln>
+          <a:extLst>
+            <a:ext uri="{C572A759-6A51-4108-AA02-DFA0A04FC94B}">
+              <ma14:wrappingTextBoxFlag xmlns:ma14="http://schemas.microsoft.com/office/mac/drawingml/2011/main" val="1"/>
+            </a:ext>
+          </a:extLst>
+        </p:spPr>
+        <p:txBody>
+          <a:bodyPr wrap="none" lIns="50800" tIns="50800" rIns="50800" bIns="50800" anchor="ctr">
+            <a:spAutoFit/>
+          </a:bodyPr>
+          <a:lstStyle>
+            <a:lvl1pPr>
+              <a:defRPr sz="2600">
+                <a:solidFill>
+                  <a:srgbClr val="000000"/>
+                </a:solidFill>
+              </a:defRPr>
+            </a:lvl1pPr>
+          </a:lstStyle>
+          <a:p>
+            <a:pPr/>
+            <a:r>
+              <a:t>OR</a:t>
+            </a:r>
+          </a:p>
+        </p:txBody>
+      </p:sp>
+      <p:sp>
+        <p:nvSpPr>
+          <p:cNvPr id="263" name="Shape 263"/>
+          <p:cNvSpPr/>
+          <p:nvPr/>
+        </p:nvSpPr>
+        <p:spPr>
+          <a:xfrm>
+            <a:off x="7290533" y="8003710"/>
+            <a:ext cx="671349" cy="558801"/>
+          </a:xfrm>
+          <a:prstGeom prst="rect">
+            <a:avLst/>
+          </a:prstGeom>
+          <a:solidFill>
+            <a:schemeClr val="accent4"/>
+          </a:solidFill>
+          <a:ln w="12700">
+            <a:miter lim="400000"/>
+          </a:ln>
+          <a:extLst>
+            <a:ext uri="{C572A759-6A51-4108-AA02-DFA0A04FC94B}">
+              <ma14:wrappingTextBoxFlag xmlns:ma14="http://schemas.microsoft.com/office/mac/drawingml/2011/main" val="1"/>
+            </a:ext>
+          </a:extLst>
+        </p:spPr>
+        <p:txBody>
+          <a:bodyPr wrap="none" lIns="50800" tIns="50800" rIns="50800" bIns="50800" anchor="ctr">
+            <a:spAutoFit/>
+          </a:bodyPr>
+          <a:lstStyle>
+            <a:lvl1pPr>
+              <a:defRPr sz="2600">
+                <a:solidFill>
+                  <a:srgbClr val="000000"/>
+                </a:solidFill>
+              </a:defRPr>
+            </a:lvl1pPr>
+          </a:lstStyle>
+          <a:p>
+            <a:pPr/>
+            <a:r>
+              <a:t>WA</a:t>
+            </a:r>
+          </a:p>
+        </p:txBody>
+      </p:sp>
+      <p:sp>
+        <p:nvSpPr>
+          <p:cNvPr id="264" name="Shape 264"/>
+          <p:cNvSpPr/>
+          <p:nvPr/>
+        </p:nvSpPr>
+        <p:spPr>
+          <a:xfrm>
+            <a:off x="10320464" y="4233882"/>
+            <a:ext cx="578892" cy="558801"/>
+          </a:xfrm>
+          <a:prstGeom prst="rect">
+            <a:avLst/>
+          </a:prstGeom>
+          <a:solidFill>
+            <a:schemeClr val="accent3">
+              <a:hueOff val="-1187647"/>
+              <a:satOff val="22407"/>
+              <a:lumOff val="18627"/>
+            </a:schemeClr>
+          </a:solidFill>
+          <a:ln w="12700">
+            <a:miter lim="400000"/>
+          </a:ln>
+          <a:extLst>
+            <a:ext uri="{C572A759-6A51-4108-AA02-DFA0A04FC94B}">
+              <ma14:wrappingTextBoxFlag xmlns:ma14="http://schemas.microsoft.com/office/mac/drawingml/2011/main" val="1"/>
+            </a:ext>
+          </a:extLst>
+        </p:spPr>
+        <p:txBody>
+          <a:bodyPr wrap="none" lIns="50800" tIns="50800" rIns="50800" bIns="50800" anchor="ctr">
+            <a:spAutoFit/>
+          </a:bodyPr>
+          <a:lstStyle>
+            <a:lvl1pPr>
+              <a:defRPr sz="2600">
+                <a:solidFill>
+                  <a:srgbClr val="000000"/>
+                </a:solidFill>
+              </a:defRPr>
+            </a:lvl1pPr>
+          </a:lstStyle>
+          <a:p>
+            <a:pPr/>
+            <a:r>
+              <a:t>CA</a:t>
+            </a:r>
+          </a:p>
+        </p:txBody>
+      </p:sp>
+      <p:sp>
+        <p:nvSpPr>
+          <p:cNvPr id="265" name="Shape 265"/>
+          <p:cNvSpPr/>
+          <p:nvPr/>
+        </p:nvSpPr>
+        <p:spPr>
+          <a:xfrm>
+            <a:off x="10311218" y="4994235"/>
+            <a:ext cx="597384" cy="558801"/>
+          </a:xfrm>
+          <a:prstGeom prst="rect">
+            <a:avLst/>
+          </a:prstGeom>
+          <a:solidFill>
+            <a:schemeClr val="accent1">
+              <a:hueOff val="-84091"/>
+              <a:satOff val="15316"/>
+              <a:lumOff val="24313"/>
+            </a:schemeClr>
+          </a:solidFill>
+          <a:ln w="12700">
+            <a:miter lim="400000"/>
+          </a:ln>
+          <a:extLst>
+            <a:ext uri="{C572A759-6A51-4108-AA02-DFA0A04FC94B}">
+              <ma14:wrappingTextBoxFlag xmlns:ma14="http://schemas.microsoft.com/office/mac/drawingml/2011/main" val="1"/>
+            </a:ext>
+          </a:extLst>
+        </p:spPr>
+        <p:txBody>
+          <a:bodyPr wrap="none" lIns="50800" tIns="50800" rIns="50800" bIns="50800" anchor="ctr">
+            <a:spAutoFit/>
+          </a:bodyPr>
+          <a:lstStyle>
+            <a:lvl1pPr>
+              <a:defRPr sz="2600">
+                <a:solidFill>
+                  <a:srgbClr val="000000"/>
+                </a:solidFill>
+              </a:defRPr>
+            </a:lvl1pPr>
+          </a:lstStyle>
+          <a:p>
+            <a:pPr/>
+            <a:r>
+              <a:t>OR</a:t>
+            </a:r>
+          </a:p>
+        </p:txBody>
+      </p:sp>
+      <p:sp>
+        <p:nvSpPr>
+          <p:cNvPr id="266" name="Shape 266"/>
+          <p:cNvSpPr/>
+          <p:nvPr/>
+        </p:nvSpPr>
+        <p:spPr>
+          <a:xfrm>
+            <a:off x="10311218" y="5754587"/>
+            <a:ext cx="671349" cy="558801"/>
+          </a:xfrm>
+          <a:prstGeom prst="rect">
+            <a:avLst/>
+          </a:prstGeom>
+          <a:solidFill>
+            <a:schemeClr val="accent4"/>
+          </a:solidFill>
+          <a:ln w="12700">
+            <a:miter lim="400000"/>
+          </a:ln>
+          <a:extLst>
+            <a:ext uri="{C572A759-6A51-4108-AA02-DFA0A04FC94B}">
+              <ma14:wrappingTextBoxFlag xmlns:ma14="http://schemas.microsoft.com/office/mac/drawingml/2011/main" val="1"/>
+            </a:ext>
+          </a:extLst>
+        </p:spPr>
+        <p:txBody>
+          <a:bodyPr wrap="none" lIns="50800" tIns="50800" rIns="50800" bIns="50800" anchor="ctr">
+            <a:spAutoFit/>
+          </a:bodyPr>
+          <a:lstStyle>
+            <a:lvl1pPr>
+              <a:defRPr sz="2600">
+                <a:solidFill>
+                  <a:srgbClr val="000000"/>
+                </a:solidFill>
+              </a:defRPr>
+            </a:lvl1pPr>
+          </a:lstStyle>
+          <a:p>
+            <a:pPr/>
+            <a:r>
+              <a:t>WA</a:t>
+            </a:r>
+          </a:p>
+        </p:txBody>
+      </p:sp>
+      <p:sp>
+        <p:nvSpPr>
+          <p:cNvPr id="267" name="Shape 267"/>
+          <p:cNvSpPr/>
+          <p:nvPr/>
+        </p:nvSpPr>
+        <p:spPr>
+          <a:xfrm>
+            <a:off x="1254280" y="2423846"/>
+            <a:ext cx="705105" cy="444501"/>
+          </a:xfrm>
+          <a:prstGeom prst="rect">
+            <a:avLst/>
+          </a:prstGeom>
+          <a:solidFill>
+            <a:srgbClr val="FFFFFF"/>
+          </a:solidFill>
+          <a:ln w="12700">
+            <a:miter lim="400000"/>
+          </a:ln>
+          <a:extLst>
+            <a:ext uri="{C572A759-6A51-4108-AA02-DFA0A04FC94B}">
+              <ma14:wrappingTextBoxFlag xmlns:ma14="http://schemas.microsoft.com/office/mac/drawingml/2011/main" val="1"/>
+            </a:ext>
+          </a:extLst>
+        </p:spPr>
+        <p:txBody>
+          <a:bodyPr wrap="none" lIns="50800" tIns="50800" rIns="50800" bIns="50800" anchor="ctr">
             <a:spAutoFit/>
           </a:bodyPr>
           <a:lstStyle/>
           <a:p>
-            <a:pPr>
-              <a:defRPr sz="5400">
-                <a:latin typeface="Anonymous Pro for Powerline"/>
-                <a:ea typeface="Anonymous Pro for Powerline"/>
-                <a:cs typeface="Anonymous Pro for Powerline"/>
-                <a:sym typeface="Anonymous Pro for Powerline"/>
-              </a:defRPr>
-            </a:pPr>
-            <a:r>
-              <a:t>select * from purchase_items where price </a:t>
-            </a:r>
-            <a:r>
-              <a:rPr>
-                <a:solidFill>
-                  <a:schemeClr val="accent3"/>
-                </a:solidFill>
-              </a:rPr>
-              <a:t>=</a:t>
-            </a:r>
-            <a:r>
-              <a:t> </a:t>
-            </a:r>
-          </a:p>
-          <a:p>
-            <a:pPr>
-              <a:defRPr sz="5400">
-                <a:latin typeface="Anonymous Pro for Powerline"/>
-                <a:ea typeface="Anonymous Pro for Powerline"/>
-                <a:cs typeface="Anonymous Pro for Powerline"/>
-                <a:sym typeface="Anonymous Pro for Powerline"/>
-              </a:defRPr>
-            </a:pPr>
-            <a:r>
-              <a:t>(select max(price) from products)</a:t>
+            <a:pPr/>
+            <a:r>
+              <a:t>State</a:t>
+            </a:r>
+          </a:p>
+        </p:txBody>
+      </p:sp>
+      <p:sp>
+        <p:nvSpPr>
+          <p:cNvPr id="268" name="Shape 268"/>
+          <p:cNvSpPr/>
+          <p:nvPr/>
+        </p:nvSpPr>
+        <p:spPr>
+          <a:xfrm>
+            <a:off x="2034240" y="2423846"/>
+            <a:ext cx="641097" cy="444501"/>
+          </a:xfrm>
+          <a:prstGeom prst="rect">
+            <a:avLst/>
+          </a:prstGeom>
+          <a:solidFill>
+            <a:srgbClr val="FFFFFF"/>
+          </a:solidFill>
+          <a:ln w="12700">
+            <a:miter lim="400000"/>
+          </a:ln>
+          <a:extLst>
+            <a:ext uri="{C572A759-6A51-4108-AA02-DFA0A04FC94B}">
+              <ma14:wrappingTextBoxFlag xmlns:ma14="http://schemas.microsoft.com/office/mac/drawingml/2011/main" val="1"/>
+            </a:ext>
+          </a:extLst>
+        </p:spPr>
+        <p:txBody>
+          <a:bodyPr wrap="none" lIns="50800" tIns="50800" rIns="50800" bIns="50800" anchor="ctr">
+            <a:spAutoFit/>
+          </a:bodyPr>
+          <a:lstStyle/>
+          <a:p>
+            <a:pPr/>
+            <a:r>
+              <a:t>Sold</a:t>
+            </a:r>
+          </a:p>
+        </p:txBody>
+      </p:sp>
+      <p:sp>
+        <p:nvSpPr>
+          <p:cNvPr id="269" name="Shape 269"/>
+          <p:cNvSpPr/>
+          <p:nvPr/>
+        </p:nvSpPr>
+        <p:spPr>
+          <a:xfrm>
+            <a:off x="5079158" y="918444"/>
+            <a:ext cx="641097" cy="444501"/>
+          </a:xfrm>
+          <a:prstGeom prst="rect">
+            <a:avLst/>
+          </a:prstGeom>
+          <a:solidFill>
+            <a:srgbClr val="FFFFFF"/>
+          </a:solidFill>
+          <a:ln w="12700">
+            <a:miter lim="400000"/>
+          </a:ln>
+          <a:extLst>
+            <a:ext uri="{C572A759-6A51-4108-AA02-DFA0A04FC94B}">
+              <ma14:wrappingTextBoxFlag xmlns:ma14="http://schemas.microsoft.com/office/mac/drawingml/2011/main" val="1"/>
+            </a:ext>
+          </a:extLst>
+        </p:spPr>
+        <p:txBody>
+          <a:bodyPr wrap="none" lIns="50800" tIns="50800" rIns="50800" bIns="50800" anchor="ctr">
+            <a:spAutoFit/>
+          </a:bodyPr>
+          <a:lstStyle/>
+          <a:p>
+            <a:pPr/>
+            <a:r>
+              <a:t>Sold</a:t>
+            </a:r>
+          </a:p>
+        </p:txBody>
+      </p:sp>
+      <p:sp>
+        <p:nvSpPr>
+          <p:cNvPr id="270" name="Shape 270"/>
+          <p:cNvSpPr/>
+          <p:nvPr/>
+        </p:nvSpPr>
+        <p:spPr>
+          <a:xfrm>
+            <a:off x="8083266" y="1269900"/>
+            <a:ext cx="641097" cy="444501"/>
+          </a:xfrm>
+          <a:prstGeom prst="rect">
+            <a:avLst/>
+          </a:prstGeom>
+          <a:solidFill>
+            <a:srgbClr val="FFFFFF"/>
+          </a:solidFill>
+          <a:ln w="12700">
+            <a:miter lim="400000"/>
+          </a:ln>
+          <a:extLst>
+            <a:ext uri="{C572A759-6A51-4108-AA02-DFA0A04FC94B}">
+              <ma14:wrappingTextBoxFlag xmlns:ma14="http://schemas.microsoft.com/office/mac/drawingml/2011/main" val="1"/>
+            </a:ext>
+          </a:extLst>
+        </p:spPr>
+        <p:txBody>
+          <a:bodyPr wrap="none" lIns="50800" tIns="50800" rIns="50800" bIns="50800" anchor="ctr">
+            <a:spAutoFit/>
+          </a:bodyPr>
+          <a:lstStyle/>
+          <a:p>
+            <a:pPr/>
+            <a:r>
+              <a:t>Sold</a:t>
+            </a:r>
+          </a:p>
+        </p:txBody>
+      </p:sp>
+      <p:sp>
+        <p:nvSpPr>
+          <p:cNvPr id="271" name="Shape 271"/>
+          <p:cNvSpPr/>
+          <p:nvPr/>
+        </p:nvSpPr>
+        <p:spPr>
+          <a:xfrm>
+            <a:off x="5079158" y="3904134"/>
+            <a:ext cx="641097" cy="444501"/>
+          </a:xfrm>
+          <a:prstGeom prst="rect">
+            <a:avLst/>
+          </a:prstGeom>
+          <a:solidFill>
+            <a:srgbClr val="FFFFFF"/>
+          </a:solidFill>
+          <a:ln w="12700">
+            <a:miter lim="400000"/>
+          </a:ln>
+          <a:extLst>
+            <a:ext uri="{C572A759-6A51-4108-AA02-DFA0A04FC94B}">
+              <ma14:wrappingTextBoxFlag xmlns:ma14="http://schemas.microsoft.com/office/mac/drawingml/2011/main" val="1"/>
+            </a:ext>
+          </a:extLst>
+        </p:spPr>
+        <p:txBody>
+          <a:bodyPr wrap="none" lIns="50800" tIns="50800" rIns="50800" bIns="50800" anchor="ctr">
+            <a:spAutoFit/>
+          </a:bodyPr>
+          <a:lstStyle/>
+          <a:p>
+            <a:pPr/>
+            <a:r>
+              <a:t>Sold</a:t>
+            </a:r>
+          </a:p>
+        </p:txBody>
+      </p:sp>
+      <p:sp>
+        <p:nvSpPr>
+          <p:cNvPr id="272" name="Shape 272"/>
+          <p:cNvSpPr/>
+          <p:nvPr/>
+        </p:nvSpPr>
+        <p:spPr>
+          <a:xfrm>
+            <a:off x="5079158" y="6944482"/>
+            <a:ext cx="641097" cy="444501"/>
+          </a:xfrm>
+          <a:prstGeom prst="rect">
+            <a:avLst/>
+          </a:prstGeom>
+          <a:solidFill>
+            <a:srgbClr val="FFFFFF"/>
+          </a:solidFill>
+          <a:ln w="12700">
+            <a:miter lim="400000"/>
+          </a:ln>
+          <a:extLst>
+            <a:ext uri="{C572A759-6A51-4108-AA02-DFA0A04FC94B}">
+              <ma14:wrappingTextBoxFlag xmlns:ma14="http://schemas.microsoft.com/office/mac/drawingml/2011/main" val="1"/>
+            </a:ext>
+          </a:extLst>
+        </p:spPr>
+        <p:txBody>
+          <a:bodyPr wrap="none" lIns="50800" tIns="50800" rIns="50800" bIns="50800" anchor="ctr">
+            <a:spAutoFit/>
+          </a:bodyPr>
+          <a:lstStyle/>
+          <a:p>
+            <a:pPr/>
+            <a:r>
+              <a:t>Sold</a:t>
+            </a:r>
+          </a:p>
+        </p:txBody>
+      </p:sp>
+      <p:sp>
+        <p:nvSpPr>
+          <p:cNvPr id="273" name="Shape 273"/>
+          <p:cNvSpPr/>
+          <p:nvPr/>
+        </p:nvSpPr>
+        <p:spPr>
+          <a:xfrm>
+            <a:off x="8083266" y="4291032"/>
+            <a:ext cx="641097" cy="444501"/>
+          </a:xfrm>
+          <a:prstGeom prst="rect">
+            <a:avLst/>
+          </a:prstGeom>
+          <a:solidFill>
+            <a:srgbClr val="FFFFFF"/>
+          </a:solidFill>
+          <a:ln w="12700">
+            <a:miter lim="400000"/>
+          </a:ln>
+          <a:extLst>
+            <a:ext uri="{C572A759-6A51-4108-AA02-DFA0A04FC94B}">
+              <ma14:wrappingTextBoxFlag xmlns:ma14="http://schemas.microsoft.com/office/mac/drawingml/2011/main" val="1"/>
+            </a:ext>
+          </a:extLst>
+        </p:spPr>
+        <p:txBody>
+          <a:bodyPr wrap="none" lIns="50800" tIns="50800" rIns="50800" bIns="50800" anchor="ctr">
+            <a:spAutoFit/>
+          </a:bodyPr>
+          <a:lstStyle/>
+          <a:p>
+            <a:pPr/>
+            <a:r>
+              <a:t>Sold</a:t>
+            </a:r>
+          </a:p>
+        </p:txBody>
+      </p:sp>
+      <p:sp>
+        <p:nvSpPr>
+          <p:cNvPr id="274" name="Shape 274"/>
+          <p:cNvSpPr/>
+          <p:nvPr/>
+        </p:nvSpPr>
+        <p:spPr>
+          <a:xfrm>
+            <a:off x="8083266" y="7312164"/>
+            <a:ext cx="641097" cy="444501"/>
+          </a:xfrm>
+          <a:prstGeom prst="rect">
+            <a:avLst/>
+          </a:prstGeom>
+          <a:solidFill>
+            <a:srgbClr val="FFFFFF"/>
+          </a:solidFill>
+          <a:ln w="12700">
+            <a:miter lim="400000"/>
+          </a:ln>
+          <a:extLst>
+            <a:ext uri="{C572A759-6A51-4108-AA02-DFA0A04FC94B}">
+              <ma14:wrappingTextBoxFlag xmlns:ma14="http://schemas.microsoft.com/office/mac/drawingml/2011/main" val="1"/>
+            </a:ext>
+          </a:extLst>
+        </p:spPr>
+        <p:txBody>
+          <a:bodyPr wrap="none" lIns="50800" tIns="50800" rIns="50800" bIns="50800" anchor="ctr">
+            <a:spAutoFit/>
+          </a:bodyPr>
+          <a:lstStyle/>
+          <a:p>
+            <a:pPr/>
+            <a:r>
+              <a:t>Sold</a:t>
+            </a:r>
+          </a:p>
+        </p:txBody>
+      </p:sp>
+      <p:sp>
+        <p:nvSpPr>
+          <p:cNvPr id="275" name="Shape 275"/>
+          <p:cNvSpPr/>
+          <p:nvPr/>
+        </p:nvSpPr>
+        <p:spPr>
+          <a:xfrm>
+            <a:off x="11082804" y="3575667"/>
+            <a:ext cx="641097" cy="444501"/>
+          </a:xfrm>
+          <a:prstGeom prst="rect">
+            <a:avLst/>
+          </a:prstGeom>
+          <a:solidFill>
+            <a:srgbClr val="FFFFFF"/>
+          </a:solidFill>
+          <a:ln w="12700">
+            <a:miter lim="400000"/>
+          </a:ln>
+          <a:extLst>
+            <a:ext uri="{C572A759-6A51-4108-AA02-DFA0A04FC94B}">
+              <ma14:wrappingTextBoxFlag xmlns:ma14="http://schemas.microsoft.com/office/mac/drawingml/2011/main" val="1"/>
+            </a:ext>
+          </a:extLst>
+        </p:spPr>
+        <p:txBody>
+          <a:bodyPr wrap="none" lIns="50800" tIns="50800" rIns="50800" bIns="50800" anchor="ctr">
+            <a:spAutoFit/>
+          </a:bodyPr>
+          <a:lstStyle/>
+          <a:p>
+            <a:pPr/>
+            <a:r>
+              <a:t>Sold</a:t>
+            </a:r>
+          </a:p>
+        </p:txBody>
+      </p:sp>
+      <p:sp>
+        <p:nvSpPr>
+          <p:cNvPr id="276" name="Shape 276"/>
+          <p:cNvSpPr/>
+          <p:nvPr/>
+        </p:nvSpPr>
+        <p:spPr>
+          <a:xfrm>
+            <a:off x="4264552" y="941872"/>
+            <a:ext cx="705105" cy="444501"/>
+          </a:xfrm>
+          <a:prstGeom prst="rect">
+            <a:avLst/>
+          </a:prstGeom>
+          <a:solidFill>
+            <a:srgbClr val="FFFFFF"/>
+          </a:solidFill>
+          <a:ln w="12700">
+            <a:miter lim="400000"/>
+          </a:ln>
+          <a:extLst>
+            <a:ext uri="{C572A759-6A51-4108-AA02-DFA0A04FC94B}">
+              <ma14:wrappingTextBoxFlag xmlns:ma14="http://schemas.microsoft.com/office/mac/drawingml/2011/main" val="1"/>
+            </a:ext>
+          </a:extLst>
+        </p:spPr>
+        <p:txBody>
+          <a:bodyPr wrap="none" lIns="50800" tIns="50800" rIns="50800" bIns="50800" anchor="ctr">
+            <a:spAutoFit/>
+          </a:bodyPr>
+          <a:lstStyle/>
+          <a:p>
+            <a:pPr/>
+            <a:r>
+              <a:t>State</a:t>
+            </a:r>
+          </a:p>
+        </p:txBody>
+      </p:sp>
+      <p:sp>
+        <p:nvSpPr>
+          <p:cNvPr id="277" name="Shape 277"/>
+          <p:cNvSpPr/>
+          <p:nvPr/>
+        </p:nvSpPr>
+        <p:spPr>
+          <a:xfrm>
+            <a:off x="4264552" y="3944944"/>
+            <a:ext cx="705105" cy="444501"/>
+          </a:xfrm>
+          <a:prstGeom prst="rect">
+            <a:avLst/>
+          </a:prstGeom>
+          <a:solidFill>
+            <a:srgbClr val="FFFFFF"/>
+          </a:solidFill>
+          <a:ln w="12700">
+            <a:miter lim="400000"/>
+          </a:ln>
+          <a:extLst>
+            <a:ext uri="{C572A759-6A51-4108-AA02-DFA0A04FC94B}">
+              <ma14:wrappingTextBoxFlag xmlns:ma14="http://schemas.microsoft.com/office/mac/drawingml/2011/main" val="1"/>
+            </a:ext>
+          </a:extLst>
+        </p:spPr>
+        <p:txBody>
+          <a:bodyPr wrap="none" lIns="50800" tIns="50800" rIns="50800" bIns="50800" anchor="ctr">
+            <a:spAutoFit/>
+          </a:bodyPr>
+          <a:lstStyle/>
+          <a:p>
+            <a:pPr/>
+            <a:r>
+              <a:t>State</a:t>
+            </a:r>
+          </a:p>
+        </p:txBody>
+      </p:sp>
+      <p:sp>
+        <p:nvSpPr>
+          <p:cNvPr id="278" name="Shape 278"/>
+          <p:cNvSpPr/>
+          <p:nvPr/>
+        </p:nvSpPr>
+        <p:spPr>
+          <a:xfrm>
+            <a:off x="4277252" y="6944482"/>
+            <a:ext cx="705105" cy="444501"/>
+          </a:xfrm>
+          <a:prstGeom prst="rect">
+            <a:avLst/>
+          </a:prstGeom>
+          <a:solidFill>
+            <a:srgbClr val="FFFFFF"/>
+          </a:solidFill>
+          <a:ln w="12700">
+            <a:miter lim="400000"/>
+          </a:ln>
+          <a:extLst>
+            <a:ext uri="{C572A759-6A51-4108-AA02-DFA0A04FC94B}">
+              <ma14:wrappingTextBoxFlag xmlns:ma14="http://schemas.microsoft.com/office/mac/drawingml/2011/main" val="1"/>
+            </a:ext>
+          </a:extLst>
+        </p:spPr>
+        <p:txBody>
+          <a:bodyPr wrap="none" lIns="50800" tIns="50800" rIns="50800" bIns="50800" anchor="ctr">
+            <a:spAutoFit/>
+          </a:bodyPr>
+          <a:lstStyle/>
+          <a:p>
+            <a:pPr/>
+            <a:r>
+              <a:t>State</a:t>
+            </a:r>
+          </a:p>
+        </p:txBody>
+      </p:sp>
+      <p:sp>
+        <p:nvSpPr>
+          <p:cNvPr id="279" name="Shape 279"/>
+          <p:cNvSpPr/>
+          <p:nvPr/>
+        </p:nvSpPr>
+        <p:spPr>
+          <a:xfrm>
+            <a:off x="7273655" y="4291032"/>
+            <a:ext cx="705105" cy="444501"/>
+          </a:xfrm>
+          <a:prstGeom prst="rect">
+            <a:avLst/>
+          </a:prstGeom>
+          <a:solidFill>
+            <a:srgbClr val="FFFFFF"/>
+          </a:solidFill>
+          <a:ln w="12700">
+            <a:miter lim="400000"/>
+          </a:ln>
+          <a:extLst>
+            <a:ext uri="{C572A759-6A51-4108-AA02-DFA0A04FC94B}">
+              <ma14:wrappingTextBoxFlag xmlns:ma14="http://schemas.microsoft.com/office/mac/drawingml/2011/main" val="1"/>
+            </a:ext>
+          </a:extLst>
+        </p:spPr>
+        <p:txBody>
+          <a:bodyPr wrap="none" lIns="50800" tIns="50800" rIns="50800" bIns="50800" anchor="ctr">
+            <a:spAutoFit/>
+          </a:bodyPr>
+          <a:lstStyle/>
+          <a:p>
+            <a:pPr/>
+            <a:r>
+              <a:t>State</a:t>
+            </a:r>
+          </a:p>
+        </p:txBody>
+      </p:sp>
+      <p:sp>
+        <p:nvSpPr>
+          <p:cNvPr id="280" name="Shape 280"/>
+          <p:cNvSpPr/>
+          <p:nvPr/>
+        </p:nvSpPr>
+        <p:spPr>
+          <a:xfrm>
+            <a:off x="10270058" y="3562967"/>
+            <a:ext cx="705105" cy="444501"/>
+          </a:xfrm>
+          <a:prstGeom prst="rect">
+            <a:avLst/>
+          </a:prstGeom>
+          <a:solidFill>
+            <a:srgbClr val="FFFFFF"/>
+          </a:solidFill>
+          <a:ln w="12700">
+            <a:miter lim="400000"/>
+          </a:ln>
+          <a:extLst>
+            <a:ext uri="{C572A759-6A51-4108-AA02-DFA0A04FC94B}">
+              <ma14:wrappingTextBoxFlag xmlns:ma14="http://schemas.microsoft.com/office/mac/drawingml/2011/main" val="1"/>
+            </a:ext>
+          </a:extLst>
+        </p:spPr>
+        <p:txBody>
+          <a:bodyPr wrap="none" lIns="50800" tIns="50800" rIns="50800" bIns="50800" anchor="ctr">
+            <a:spAutoFit/>
+          </a:bodyPr>
+          <a:lstStyle/>
+          <a:p>
+            <a:pPr/>
+            <a:r>
+              <a:t>State</a:t>
+            </a:r>
+          </a:p>
+        </p:txBody>
+      </p:sp>
+      <p:sp>
+        <p:nvSpPr>
+          <p:cNvPr id="281" name="Shape 281"/>
+          <p:cNvSpPr/>
+          <p:nvPr/>
+        </p:nvSpPr>
+        <p:spPr>
+          <a:xfrm>
+            <a:off x="7260955" y="7312164"/>
+            <a:ext cx="705105" cy="444501"/>
+          </a:xfrm>
+          <a:prstGeom prst="rect">
+            <a:avLst/>
+          </a:prstGeom>
+          <a:solidFill>
+            <a:srgbClr val="FFFFFF"/>
+          </a:solidFill>
+          <a:ln w="12700">
+            <a:miter lim="400000"/>
+          </a:ln>
+          <a:extLst>
+            <a:ext uri="{C572A759-6A51-4108-AA02-DFA0A04FC94B}">
+              <ma14:wrappingTextBoxFlag xmlns:ma14="http://schemas.microsoft.com/office/mac/drawingml/2011/main" val="1"/>
+            </a:ext>
+          </a:extLst>
+        </p:spPr>
+        <p:txBody>
+          <a:bodyPr wrap="none" lIns="50800" tIns="50800" rIns="50800" bIns="50800" anchor="ctr">
+            <a:spAutoFit/>
+          </a:bodyPr>
+          <a:lstStyle/>
+          <a:p>
+            <a:pPr/>
+            <a:r>
+              <a:t>State</a:t>
+            </a:r>
+          </a:p>
+        </p:txBody>
+      </p:sp>
+      <p:sp>
+        <p:nvSpPr>
+          <p:cNvPr id="282" name="Shape 282"/>
+          <p:cNvSpPr/>
+          <p:nvPr/>
+        </p:nvSpPr>
+        <p:spPr>
+          <a:xfrm>
+            <a:off x="7260955" y="1273191"/>
+            <a:ext cx="705105" cy="444501"/>
+          </a:xfrm>
+          <a:prstGeom prst="rect">
+            <a:avLst/>
+          </a:prstGeom>
+          <a:solidFill>
+            <a:srgbClr val="FFFFFF"/>
+          </a:solidFill>
+          <a:ln w="12700">
+            <a:miter lim="400000"/>
+          </a:ln>
+          <a:extLst>
+            <a:ext uri="{C572A759-6A51-4108-AA02-DFA0A04FC94B}">
+              <ma14:wrappingTextBoxFlag xmlns:ma14="http://schemas.microsoft.com/office/mac/drawingml/2011/main" val="1"/>
+            </a:ext>
+          </a:extLst>
+        </p:spPr>
+        <p:txBody>
+          <a:bodyPr wrap="none" lIns="50800" tIns="50800" rIns="50800" bIns="50800" anchor="ctr">
+            <a:spAutoFit/>
+          </a:bodyPr>
+          <a:lstStyle/>
+          <a:p>
+            <a:pPr/>
+            <a:r>
+              <a:t>State</a:t>
             </a:r>
           </a:p>
         </p:txBody>
@@ -6415,7 +7865,7 @@
       </p:grpSpPr>
       <p:sp>
         <p:nvSpPr>
-          <p:cNvPr id="251" name="Shape 251"/>
+          <p:cNvPr id="284" name="Shape 284"/>
           <p:cNvSpPr/>
           <p:nvPr>
             <p:ph type="title"/>
@@ -6423,8 +7873,8 @@
         </p:nvSpPr>
         <p:spPr>
           <a:xfrm>
-            <a:off x="406400" y="1651000"/>
-            <a:ext cx="12192000" cy="1574205"/>
+            <a:off x="406400" y="1536700"/>
+            <a:ext cx="12192000" cy="1169260"/>
           </a:xfrm>
           <a:prstGeom prst="rect">
             <a:avLst/>
@@ -6433,94 +7883,63 @@
         <p:txBody>
           <a:bodyPr/>
           <a:lstStyle>
-            <a:lvl1pPr>
-              <a:defRPr sz="8000"/>
+            <a:lvl1pPr defTabSz="403097">
+              <a:spcBef>
+                <a:spcPts val="1900"/>
+              </a:spcBef>
+              <a:defRPr sz="8280"/>
             </a:lvl1pPr>
           </a:lstStyle>
           <a:p>
             <a:pPr/>
             <a:r>
-              <a:t>Multiple Value subquery</a:t>
-            </a:r>
-          </a:p>
-        </p:txBody>
-      </p:sp>
-      <p:sp>
-        <p:nvSpPr>
-          <p:cNvPr id="252" name="Shape 252"/>
-          <p:cNvSpPr/>
-          <p:nvPr/>
-        </p:nvSpPr>
-        <p:spPr>
-          <a:xfrm>
-            <a:off x="604849" y="3563970"/>
-            <a:ext cx="12445512" cy="4013201"/>
-          </a:xfrm>
-          <a:prstGeom prst="rect">
-            <a:avLst/>
-          </a:prstGeom>
-          <a:ln w="12700">
-            <a:miter lim="400000"/>
-          </a:ln>
-          <a:extLst>
-            <a:ext uri="{C572A759-6A51-4108-AA02-DFA0A04FC94B}">
-              <ma14:wrappingTextBoxFlag xmlns:ma14="http://schemas.microsoft.com/office/mac/drawingml/2011/main" val="1"/>
-            </a:ext>
-          </a:extLst>
-        </p:spPr>
-        <p:txBody>
-          <a:bodyPr lIns="50800" tIns="50800" rIns="50800" bIns="50800" anchor="ctr">
-            <a:spAutoFit/>
-          </a:bodyPr>
+              <a:t>2-step SYNTAX</a:t>
+            </a:r>
+          </a:p>
+        </p:txBody>
+      </p:sp>
+      <p:sp>
+        <p:nvSpPr>
+          <p:cNvPr id="285" name="Shape 285"/>
+          <p:cNvSpPr/>
+          <p:nvPr>
+            <p:ph type="body" idx="1"/>
+          </p:nvPr>
+        </p:nvSpPr>
+        <p:spPr>
+          <a:xfrm>
+            <a:off x="406400" y="3055946"/>
+            <a:ext cx="12192000" cy="6108378"/>
+          </a:xfrm>
+          <a:prstGeom prst="rect">
+            <a:avLst/>
+          </a:prstGeom>
+        </p:spPr>
+        <p:txBody>
+          <a:bodyPr/>
           <a:lstStyle/>
           <a:p>
-            <a:pPr>
-              <a:defRPr sz="5400">
-                <a:latin typeface="Anonymous Pro for Powerline"/>
-                <a:ea typeface="Anonymous Pro for Powerline"/>
-                <a:cs typeface="Anonymous Pro for Powerline"/>
-                <a:sym typeface="Anonymous Pro for Powerline"/>
-              </a:defRPr>
+            <a:pPr marL="1243105" indent="-1243105">
+              <a:buClrTx/>
+              <a:buSzPct val="100000"/>
+              <a:buFontTx/>
+              <a:buAutoNum type="arabicPeriod" startAt="1"/>
+              <a:defRPr sz="6400"/>
             </a:pPr>
             <a:r>
-              <a:t>select * from purchase_items where price </a:t>
-            </a:r>
-            <a:r>
-              <a:rPr>
-                <a:solidFill>
-                  <a:schemeClr val="accent3"/>
-                </a:solidFill>
-              </a:rPr>
-              <a:t>in</a:t>
-            </a:r>
-            <a:r>
-              <a:t> </a:t>
-            </a:r>
-          </a:p>
-          <a:p>
-            <a:pPr>
-              <a:defRPr sz="5400">
-                <a:latin typeface="Anonymous Pro for Powerline"/>
-                <a:ea typeface="Anonymous Pro for Powerline"/>
-                <a:cs typeface="Anonymous Pro for Powerline"/>
-                <a:sym typeface="Anonymous Pro for Powerline"/>
-              </a:defRPr>
+              <a:t>SELECT column FROM table GROUP BY column</a:t>
+            </a:r>
+          </a:p>
+          <a:p>
+            <a:pPr marL="1243105" indent="-1243105">
+              <a:buClrTx/>
+              <a:buSzPct val="100000"/>
+              <a:buFontTx/>
+              <a:buAutoNum type="arabicPeriod" startAt="1"/>
+              <a:defRPr sz="6400"/>
             </a:pPr>
             <a:r>
-              <a:t>(select price from products</a:t>
-            </a:r>
-          </a:p>
-          <a:p>
-            <a:pPr>
-              <a:defRPr sz="5400">
-                <a:latin typeface="Anonymous Pro for Powerline"/>
-                <a:ea typeface="Anonymous Pro for Powerline"/>
-                <a:cs typeface="Anonymous Pro for Powerline"/>
-                <a:sym typeface="Anonymous Pro for Powerline"/>
-              </a:defRPr>
-            </a:pPr>
-            <a:r>
-              <a:t> where name like ‘% TV’)</a:t>
+              <a:t>Add any aggregated columns </a:t>
             </a:r>
           </a:p>
         </p:txBody>
@@ -6553,7 +7972,7 @@
       </p:grpSpPr>
       <p:sp>
         <p:nvSpPr>
-          <p:cNvPr id="254" name="Shape 254"/>
+          <p:cNvPr id="287" name="Shape 287"/>
           <p:cNvSpPr/>
           <p:nvPr>
             <p:ph type="title"/>
@@ -6561,8 +7980,8 @@
         </p:nvSpPr>
         <p:spPr>
           <a:xfrm>
-            <a:off x="406400" y="1651000"/>
-            <a:ext cx="12192000" cy="1574205"/>
+            <a:off x="406400" y="1536700"/>
+            <a:ext cx="12192000" cy="1169260"/>
           </a:xfrm>
           <a:prstGeom prst="rect">
             <a:avLst/>
@@ -6571,81 +7990,50 @@
         <p:txBody>
           <a:bodyPr/>
           <a:lstStyle>
-            <a:lvl1pPr>
-              <a:defRPr sz="8000"/>
+            <a:lvl1pPr defTabSz="403097">
+              <a:spcBef>
+                <a:spcPts val="1900"/>
+              </a:spcBef>
+              <a:defRPr sz="8280"/>
             </a:lvl1pPr>
           </a:lstStyle>
           <a:p>
             <a:pPr/>
             <a:r>
-              <a:t>Bad subquery</a:t>
-            </a:r>
-          </a:p>
-        </p:txBody>
-      </p:sp>
-      <p:sp>
-        <p:nvSpPr>
-          <p:cNvPr id="255" name="Shape 255"/>
-          <p:cNvSpPr/>
-          <p:nvPr/>
-        </p:nvSpPr>
-        <p:spPr>
-          <a:xfrm>
-            <a:off x="604849" y="4129120"/>
-            <a:ext cx="12445512" cy="2882901"/>
-          </a:xfrm>
-          <a:prstGeom prst="rect">
-            <a:avLst/>
-          </a:prstGeom>
-          <a:ln w="12700">
-            <a:miter lim="400000"/>
-          </a:ln>
-          <a:extLst>
-            <a:ext uri="{C572A759-6A51-4108-AA02-DFA0A04FC94B}">
-              <ma14:wrappingTextBoxFlag xmlns:ma14="http://schemas.microsoft.com/office/mac/drawingml/2011/main" val="1"/>
-            </a:ext>
-          </a:extLst>
-        </p:spPr>
-        <p:txBody>
-          <a:bodyPr lIns="50800" tIns="50800" rIns="50800" bIns="50800" anchor="ctr">
-            <a:spAutoFit/>
-          </a:bodyPr>
-          <a:lstStyle/>
-          <a:p>
-            <a:pPr>
-              <a:defRPr sz="5400">
-                <a:latin typeface="Anonymous Pro for Powerline"/>
-                <a:ea typeface="Anonymous Pro for Powerline"/>
-                <a:cs typeface="Anonymous Pro for Powerline"/>
-                <a:sym typeface="Anonymous Pro for Powerline"/>
-              </a:defRPr>
-            </a:pPr>
-            <a:r>
-              <a:t>select * from purchase_items where price </a:t>
-            </a:r>
-            <a:r>
-              <a:rPr>
-                <a:solidFill>
-                  <a:schemeClr val="accent3"/>
-                </a:solidFill>
-              </a:rPr>
-              <a:t>in</a:t>
-            </a:r>
-            <a:r>
-              <a:t> </a:t>
-            </a:r>
-          </a:p>
-          <a:p>
-            <a:pPr>
-              <a:defRPr sz="5400">
-                <a:latin typeface="Anonymous Pro for Powerline"/>
-                <a:ea typeface="Anonymous Pro for Powerline"/>
-                <a:cs typeface="Anonymous Pro for Powerline"/>
-                <a:sym typeface="Anonymous Pro for Powerline"/>
-              </a:defRPr>
-            </a:pPr>
-            <a:r>
-              <a:t>(select * from products)</a:t>
+              <a:t>Example #1: Purchases per User</a:t>
+            </a:r>
+          </a:p>
+        </p:txBody>
+      </p:sp>
+      <p:sp>
+        <p:nvSpPr>
+          <p:cNvPr id="288" name="Shape 288"/>
+          <p:cNvSpPr/>
+          <p:nvPr>
+            <p:ph type="body" idx="1"/>
+          </p:nvPr>
+        </p:nvSpPr>
+        <p:spPr>
+          <a:xfrm>
+            <a:off x="406399" y="4321058"/>
+            <a:ext cx="12192001" cy="6108377"/>
+          </a:xfrm>
+          <a:prstGeom prst="rect">
+            <a:avLst/>
+          </a:prstGeom>
+        </p:spPr>
+        <p:txBody>
+          <a:bodyPr/>
+          <a:lstStyle>
+            <a:lvl1pPr marL="836705" indent="-836705">
+              <a:buChar char="‣"/>
+              <a:defRPr sz="6400"/>
+            </a:lvl1pPr>
+          </a:lstStyle>
+          <a:p>
+            <a:pPr/>
+            <a:r>
+              <a:t>How many purchases has each user made?</a:t>
             </a:r>
           </a:p>
         </p:txBody>
@@ -6678,7 +8066,7 @@
       </p:grpSpPr>
       <p:sp>
         <p:nvSpPr>
-          <p:cNvPr id="257" name="Shape 257"/>
+          <p:cNvPr id="290" name="Shape 290"/>
           <p:cNvSpPr/>
           <p:nvPr>
             <p:ph type="title"/>
@@ -6686,8 +8074,8 @@
         </p:nvSpPr>
         <p:spPr>
           <a:xfrm>
-            <a:off x="406400" y="1651000"/>
-            <a:ext cx="12192000" cy="1574205"/>
+            <a:off x="406400" y="1536700"/>
+            <a:ext cx="12192000" cy="1169260"/>
           </a:xfrm>
           <a:prstGeom prst="rect">
             <a:avLst/>
@@ -6696,28 +8084,31 @@
         <p:txBody>
           <a:bodyPr/>
           <a:lstStyle>
-            <a:lvl1pPr>
-              <a:defRPr sz="8000"/>
+            <a:lvl1pPr defTabSz="403097">
+              <a:spcBef>
+                <a:spcPts val="1900"/>
+              </a:spcBef>
+              <a:defRPr sz="8280"/>
             </a:lvl1pPr>
           </a:lstStyle>
           <a:p>
             <a:pPr/>
             <a:r>
-              <a:t>Bad subquery</a:t>
-            </a:r>
-          </a:p>
-        </p:txBody>
-      </p:sp>
-      <p:sp>
-        <p:nvSpPr>
-          <p:cNvPr id="258" name="Shape 258"/>
+              <a:t>Example #1: Purchases per User</a:t>
+            </a:r>
+          </a:p>
+        </p:txBody>
+      </p:sp>
+      <p:sp>
+        <p:nvSpPr>
+          <p:cNvPr id="291" name="Shape 291"/>
           <p:cNvSpPr/>
           <p:nvPr/>
         </p:nvSpPr>
         <p:spPr>
           <a:xfrm>
-            <a:off x="604849" y="4129120"/>
-            <a:ext cx="12445512" cy="2882901"/>
+            <a:off x="645660" y="3564475"/>
+            <a:ext cx="12192001" cy="3644901"/>
           </a:xfrm>
           <a:prstGeom prst="rect">
             <a:avLst/>
@@ -6738,7 +8129,7 @@
           <a:lstStyle/>
           <a:p>
             <a:pPr>
-              <a:defRPr sz="5400">
+              <a:defRPr sz="6400">
                 <a:latin typeface="Anonymous Pro for Powerline"/>
                 <a:ea typeface="Anonymous Pro for Powerline"/>
                 <a:cs typeface="Anonymous Pro for Powerline"/>
@@ -6746,23 +8137,12 @@
               </a:defRPr>
             </a:pPr>
             <a:r>
-              <a:t>select * from purchase_items where price </a:t>
-            </a:r>
-            <a:r>
-              <a:rPr>
-                <a:solidFill>
-                  <a:schemeClr val="accent3"/>
-                </a:solidFill>
-              </a:rPr>
-              <a:t>in</a:t>
-            </a:r>
-            <a:r>
-              <a:t> </a:t>
+              <a:t>SELECT user_id</a:t>
             </a:r>
           </a:p>
           <a:p>
             <a:pPr>
-              <a:defRPr sz="5400">
+              <a:defRPr sz="6400">
                 <a:latin typeface="Anonymous Pro for Powerline"/>
                 <a:ea typeface="Anonymous Pro for Powerline"/>
                 <a:cs typeface="Anonymous Pro for Powerline"/>
@@ -6770,98 +8150,21 @@
               </a:defRPr>
             </a:pPr>
             <a:r>
-              <a:t>(select * from products)</a:t>
-            </a:r>
-          </a:p>
-        </p:txBody>
-      </p:sp>
-      <p:sp>
-        <p:nvSpPr>
-          <p:cNvPr id="259" name="Shape 259"/>
-          <p:cNvSpPr/>
-          <p:nvPr/>
-        </p:nvSpPr>
-        <p:spPr>
-          <a:xfrm rot="18900000">
-            <a:off x="4420237" y="4771426"/>
-            <a:ext cx="472611" cy="2882902"/>
-          </a:xfrm>
-          <a:prstGeom prst="rect">
-            <a:avLst/>
-          </a:prstGeom>
-          <a:solidFill>
-            <a:schemeClr val="accent5"/>
-          </a:solidFill>
-          <a:ln w="12700">
-            <a:miter lim="400000"/>
-          </a:ln>
-        </p:spPr>
-        <p:txBody>
-          <a:bodyPr lIns="50800" tIns="50800" rIns="50800" bIns="50800" anchor="ctr"/>
-          <a:lstStyle/>
-          <a:p>
-            <a:pPr algn="ctr">
-              <a:lnSpc>
-                <a:spcPct val="80000"/>
-              </a:lnSpc>
-              <a:spcBef>
-                <a:spcPts val="0"/>
-              </a:spcBef>
-              <a:defRPr cap="all" sz="2800">
-                <a:solidFill>
-                  <a:srgbClr val="FFFFFF"/>
-                </a:solidFill>
-                <a:latin typeface="+mn-lt"/>
-                <a:ea typeface="+mn-ea"/>
-                <a:cs typeface="+mn-cs"/>
-                <a:sym typeface="DIN Condensed"/>
+              <a:t>FROM purchases </a:t>
+            </a:r>
+          </a:p>
+          <a:p>
+            <a:pPr>
+              <a:defRPr sz="6400">
+                <a:latin typeface="Anonymous Pro for Powerline"/>
+                <a:ea typeface="Anonymous Pro for Powerline"/>
+                <a:cs typeface="Anonymous Pro for Powerline"/>
+                <a:sym typeface="Anonymous Pro for Powerline"/>
               </a:defRPr>
             </a:pPr>
-          </a:p>
-        </p:txBody>
-      </p:sp>
-      <p:sp>
-        <p:nvSpPr>
-          <p:cNvPr id="260" name="Shape 260"/>
-          <p:cNvSpPr/>
-          <p:nvPr/>
-        </p:nvSpPr>
-        <p:spPr>
-          <a:xfrm rot="2700000">
-            <a:off x="4420237" y="4771426"/>
-            <a:ext cx="472611" cy="2882902"/>
-          </a:xfrm>
-          <a:prstGeom prst="rect">
-            <a:avLst/>
-          </a:prstGeom>
-          <a:solidFill>
-            <a:schemeClr val="accent5"/>
-          </a:solidFill>
-          <a:ln w="12700">
-            <a:miter lim="400000"/>
-          </a:ln>
-        </p:spPr>
-        <p:txBody>
-          <a:bodyPr lIns="50800" tIns="50800" rIns="50800" bIns="50800" anchor="ctr"/>
-          <a:lstStyle/>
-          <a:p>
-            <a:pPr algn="ctr">
-              <a:lnSpc>
-                <a:spcPct val="80000"/>
-              </a:lnSpc>
-              <a:spcBef>
-                <a:spcPts val="0"/>
-              </a:spcBef>
-              <a:defRPr cap="all" sz="2800">
-                <a:solidFill>
-                  <a:srgbClr val="FFFFFF"/>
-                </a:solidFill>
-                <a:latin typeface="+mn-lt"/>
-                <a:ea typeface="+mn-ea"/>
-                <a:cs typeface="+mn-cs"/>
-                <a:sym typeface="DIN Condensed"/>
-              </a:defRPr>
-            </a:pPr>
+            <a:r>
+              <a:t>GROUP BY user_id;</a:t>
+            </a:r>
           </a:p>
         </p:txBody>
       </p:sp>
@@ -6947,46 +8250,14 @@
       </p:grpSpPr>
       <p:sp>
         <p:nvSpPr>
-          <p:cNvPr id="262" name="Shape 262"/>
-          <p:cNvSpPr/>
-          <p:nvPr>
-            <p:ph type="title"/>
-          </p:nvPr>
-        </p:nvSpPr>
-        <p:spPr>
-          <a:xfrm>
-            <a:off x="406400" y="1651000"/>
-            <a:ext cx="12192000" cy="1574205"/>
-          </a:xfrm>
-          <a:prstGeom prst="rect">
-            <a:avLst/>
-          </a:prstGeom>
-        </p:spPr>
-        <p:txBody>
-          <a:bodyPr/>
-          <a:lstStyle>
-            <a:lvl1pPr>
-              <a:defRPr sz="8000"/>
-            </a:lvl1pPr>
-          </a:lstStyle>
-          <a:p>
-            <a:pPr/>
-            <a:r>
-              <a:t>Exists</a:t>
-            </a:r>
-          </a:p>
-        </p:txBody>
-      </p:sp>
-      <p:sp>
-        <p:nvSpPr>
-          <p:cNvPr id="263" name="Shape 263"/>
+          <p:cNvPr id="293" name="Shape 293"/>
           <p:cNvSpPr/>
           <p:nvPr/>
         </p:nvSpPr>
         <p:spPr>
           <a:xfrm>
-            <a:off x="441609" y="3870081"/>
-            <a:ext cx="13721542" cy="3403601"/>
+            <a:off x="645660" y="3564475"/>
+            <a:ext cx="12192001" cy="3644901"/>
           </a:xfrm>
           <a:prstGeom prst="rect">
             <a:avLst/>
@@ -7007,7 +8278,7 @@
           <a:lstStyle/>
           <a:p>
             <a:pPr>
-              <a:defRPr sz="5400">
+              <a:defRPr sz="6400">
                 <a:latin typeface="Anonymous Pro for Powerline"/>
                 <a:ea typeface="Anonymous Pro for Powerline"/>
                 <a:cs typeface="Anonymous Pro for Powerline"/>
@@ -7015,7 +8286,7 @@
               </a:defRPr>
             </a:pPr>
             <a:r>
-              <a:t>SELECT * FROM users WHERE EXISTS                             (</a:t>
+              <a:t>SELECT user_id</a:t>
             </a:r>
             <a:r>
               <a:rPr>
@@ -7023,10 +8294,68 @@
                   <a:schemeClr val="accent3"/>
                 </a:solidFill>
               </a:rPr>
-              <a:t>SELECT 1</a:t>
-            </a:r>
-            <a:r>
-              <a:t> FROM purchases WHERE users.id = purchases.user_id                and purchases.name LIKE 'Bob%')</a:t>
+              <a:t>, count(*)</a:t>
+            </a:r>
+          </a:p>
+          <a:p>
+            <a:pPr>
+              <a:defRPr sz="6400">
+                <a:latin typeface="Anonymous Pro for Powerline"/>
+                <a:ea typeface="Anonymous Pro for Powerline"/>
+                <a:cs typeface="Anonymous Pro for Powerline"/>
+                <a:sym typeface="Anonymous Pro for Powerline"/>
+              </a:defRPr>
+            </a:pPr>
+            <a:r>
+              <a:t>FROM purchases </a:t>
+            </a:r>
+          </a:p>
+          <a:p>
+            <a:pPr>
+              <a:defRPr sz="6400">
+                <a:latin typeface="Anonymous Pro for Powerline"/>
+                <a:ea typeface="Anonymous Pro for Powerline"/>
+                <a:cs typeface="Anonymous Pro for Powerline"/>
+                <a:sym typeface="Anonymous Pro for Powerline"/>
+              </a:defRPr>
+            </a:pPr>
+            <a:r>
+              <a:t>GROUP BY user_id;</a:t>
+            </a:r>
+          </a:p>
+        </p:txBody>
+      </p:sp>
+      <p:sp>
+        <p:nvSpPr>
+          <p:cNvPr id="294" name="Shape 294"/>
+          <p:cNvSpPr/>
+          <p:nvPr>
+            <p:ph type="title"/>
+          </p:nvPr>
+        </p:nvSpPr>
+        <p:spPr>
+          <a:xfrm>
+            <a:off x="406400" y="1536700"/>
+            <a:ext cx="12192000" cy="1169260"/>
+          </a:xfrm>
+          <a:prstGeom prst="rect">
+            <a:avLst/>
+          </a:prstGeom>
+        </p:spPr>
+        <p:txBody>
+          <a:bodyPr/>
+          <a:lstStyle>
+            <a:lvl1pPr defTabSz="403097">
+              <a:spcBef>
+                <a:spcPts val="1900"/>
+              </a:spcBef>
+              <a:defRPr sz="8280"/>
+            </a:lvl1pPr>
+          </a:lstStyle>
+          <a:p>
+            <a:pPr/>
+            <a:r>
+              <a:t>Example #1: Purchases per User</a:t>
             </a:r>
           </a:p>
         </p:txBody>
@@ -7059,7 +8388,7 @@
       </p:grpSpPr>
       <p:sp>
         <p:nvSpPr>
-          <p:cNvPr id="265" name="Shape 265"/>
+          <p:cNvPr id="296" name="Shape 296"/>
           <p:cNvSpPr/>
           <p:nvPr>
             <p:ph type="title"/>
@@ -7067,8 +8396,8 @@
         </p:nvSpPr>
         <p:spPr>
           <a:xfrm>
-            <a:off x="2802102" y="4038600"/>
-            <a:ext cx="7400596" cy="4521200"/>
+            <a:off x="406400" y="1536700"/>
+            <a:ext cx="12192000" cy="1169260"/>
           </a:xfrm>
           <a:prstGeom prst="rect">
             <a:avLst/>
@@ -7076,11 +8405,56 @@
         </p:spPr>
         <p:txBody>
           <a:bodyPr/>
-          <a:lstStyle/>
-          <a:p>
-            <a:pPr/>
-            <a:r>
-              <a:t>Exercises</a:t>
+          <a:lstStyle>
+            <a:lvl1pPr defTabSz="397256">
+              <a:spcBef>
+                <a:spcPts val="1900"/>
+              </a:spcBef>
+              <a:defRPr sz="8160"/>
+            </a:lvl1pPr>
+          </a:lstStyle>
+          <a:p>
+            <a:pPr/>
+            <a:r>
+              <a:t>Example #2: quantity per product</a:t>
+            </a:r>
+          </a:p>
+        </p:txBody>
+      </p:sp>
+      <p:sp>
+        <p:nvSpPr>
+          <p:cNvPr id="297" name="Shape 297"/>
+          <p:cNvSpPr/>
+          <p:nvPr>
+            <p:ph type="body" idx="1"/>
+          </p:nvPr>
+        </p:nvSpPr>
+        <p:spPr>
+          <a:xfrm>
+            <a:off x="406400" y="4321058"/>
+            <a:ext cx="12192000" cy="6108377"/>
+          </a:xfrm>
+          <a:prstGeom prst="rect">
+            <a:avLst/>
+          </a:prstGeom>
+        </p:spPr>
+        <p:txBody>
+          <a:bodyPr/>
+          <a:lstStyle>
+            <a:lvl1pPr marL="705970" indent="-705970">
+              <a:buClrTx/>
+              <a:buSzPct val="40000"/>
+              <a:buFontTx/>
+              <a:buBlip>
+                <a:blip r:embed="rId2"/>
+              </a:buBlip>
+              <a:defRPr sz="6400"/>
+            </a:lvl1pPr>
+          </a:lstStyle>
+          <a:p>
+            <a:pPr/>
+            <a:r>
+              <a:t>What is the total quantity of each product purchased?</a:t>
             </a:r>
           </a:p>
         </p:txBody>
@@ -7113,7 +8487,7 @@
       </p:grpSpPr>
       <p:sp>
         <p:nvSpPr>
-          <p:cNvPr id="267" name="Shape 267"/>
+          <p:cNvPr id="299" name="Shape 299"/>
           <p:cNvSpPr/>
           <p:nvPr>
             <p:ph type="title"/>
@@ -7121,8 +8495,8 @@
         </p:nvSpPr>
         <p:spPr>
           <a:xfrm>
-            <a:off x="406400" y="1536700"/>
-            <a:ext cx="12192000" cy="1169260"/>
+            <a:off x="406400" y="1700669"/>
+            <a:ext cx="12192000" cy="1169261"/>
           </a:xfrm>
           <a:prstGeom prst="rect">
             <a:avLst/>
@@ -7131,98 +8505,31 @@
         <p:txBody>
           <a:bodyPr/>
           <a:lstStyle>
-            <a:lvl1pPr defTabSz="403097">
+            <a:lvl1pPr defTabSz="397256">
               <a:spcBef>
                 <a:spcPts val="1900"/>
               </a:spcBef>
-              <a:defRPr sz="8280"/>
+              <a:defRPr sz="8160"/>
             </a:lvl1pPr>
           </a:lstStyle>
           <a:p>
             <a:pPr/>
             <a:r>
-              <a:t>Primary key</a:t>
-            </a:r>
-          </a:p>
-        </p:txBody>
-      </p:sp>
-      <p:sp>
-        <p:nvSpPr>
-          <p:cNvPr id="268" name="Shape 268"/>
-          <p:cNvSpPr/>
-          <p:nvPr>
-            <p:ph type="body" sz="quarter" idx="1"/>
-          </p:nvPr>
-        </p:nvSpPr>
-        <p:spPr>
-          <a:xfrm>
-            <a:off x="406400" y="3002210"/>
-            <a:ext cx="12192000" cy="1332501"/>
-          </a:xfrm>
-          <a:prstGeom prst="rect">
-            <a:avLst/>
-          </a:prstGeom>
-        </p:spPr>
-        <p:txBody>
-          <a:bodyPr/>
-          <a:lstStyle>
-            <a:lvl1pPr marL="705970" indent="-705970">
-              <a:buClrTx/>
-              <a:buSzPct val="40000"/>
-              <a:buFontTx/>
-              <a:buBlip>
-                <a:blip r:embed="rId2"/>
-              </a:buBlip>
-              <a:defRPr sz="6400"/>
-            </a:lvl1pPr>
-          </a:lstStyle>
-          <a:p>
-            <a:pPr/>
-            <a:r>
-              <a:t>Column that is unique per row</a:t>
-            </a:r>
-          </a:p>
-        </p:txBody>
-      </p:sp>
-      <p:pic>
-        <p:nvPicPr>
-          <p:cNvPr id="269" name="pasted-image.png"/>
-          <p:cNvPicPr>
-            <a:picLocks noChangeAspect="1"/>
-          </p:cNvPicPr>
+              <a:t>Example #2: quantity per product</a:t>
+            </a:r>
+          </a:p>
+        </p:txBody>
+      </p:sp>
+      <p:sp>
+        <p:nvSpPr>
+          <p:cNvPr id="300" name="Shape 300"/>
+          <p:cNvSpPr/>
           <p:nvPr/>
-        </p:nvPicPr>
-        <p:blipFill>
-          <a:blip r:embed="rId3">
-            <a:extLst/>
-          </a:blip>
-          <a:stretch>
-            <a:fillRect/>
-          </a:stretch>
-        </p:blipFill>
-        <p:spPr>
-          <a:xfrm>
-            <a:off x="6492882" y="5741633"/>
-            <a:ext cx="6105651" cy="3433531"/>
-          </a:xfrm>
-          <a:prstGeom prst="rect">
-            <a:avLst/>
-          </a:prstGeom>
-          <a:ln w="12700">
-            <a:miter lim="400000"/>
-          </a:ln>
-        </p:spPr>
-      </p:pic>
-      <p:sp>
-        <p:nvSpPr>
-          <p:cNvPr id="270" name="Shape 270"/>
-          <p:cNvSpPr/>
-          <p:nvPr/>
-        </p:nvSpPr>
-        <p:spPr>
-          <a:xfrm>
-            <a:off x="380542" y="4432247"/>
-            <a:ext cx="6851949" cy="4521201"/>
+        </p:nvSpPr>
+        <p:spPr>
+          <a:xfrm>
+            <a:off x="482599" y="4189727"/>
+            <a:ext cx="13854453" cy="3454401"/>
           </a:xfrm>
           <a:prstGeom prst="rect">
             <a:avLst/>
@@ -7240,22 +8547,44 @@
           <a:bodyPr lIns="50800" tIns="50800" rIns="50800" bIns="50800" anchor="ctr">
             <a:spAutoFit/>
           </a:bodyPr>
-          <a:lstStyle>
-            <a:lvl1pPr marL="705970" indent="-705970">
-              <a:spcBef>
-                <a:spcPts val="2800"/>
-              </a:spcBef>
-              <a:buSzPct val="40000"/>
-              <a:buBlip>
-                <a:blip r:embed="rId2"/>
-              </a:buBlip>
-              <a:defRPr sz="6400"/>
-            </a:lvl1pPr>
-          </a:lstStyle>
-          <a:p>
-            <a:pPr/>
-            <a:r>
-              <a:t>Never changes, like a Social Security Number</a:t>
+          <a:lstStyle/>
+          <a:p>
+            <a:pPr>
+              <a:defRPr sz="6000">
+                <a:latin typeface="Anonymous Pro for Powerline"/>
+                <a:ea typeface="Anonymous Pro for Powerline"/>
+                <a:cs typeface="Anonymous Pro for Powerline"/>
+                <a:sym typeface="Anonymous Pro for Powerline"/>
+              </a:defRPr>
+            </a:pPr>
+            <a:r>
+              <a:t>SELECT user_id</a:t>
+            </a:r>
+          </a:p>
+          <a:p>
+            <a:pPr>
+              <a:defRPr sz="6000">
+                <a:latin typeface="Anonymous Pro for Powerline"/>
+                <a:ea typeface="Anonymous Pro for Powerline"/>
+                <a:cs typeface="Anonymous Pro for Powerline"/>
+                <a:sym typeface="Anonymous Pro for Powerline"/>
+              </a:defRPr>
+            </a:pPr>
+            <a:r>
+              <a:t>FROM purchases </a:t>
+            </a:r>
+          </a:p>
+          <a:p>
+            <a:pPr>
+              <a:defRPr sz="6000">
+                <a:latin typeface="Anonymous Pro for Powerline"/>
+                <a:ea typeface="Anonymous Pro for Powerline"/>
+                <a:cs typeface="Anonymous Pro for Powerline"/>
+                <a:sym typeface="Anonymous Pro for Powerline"/>
+              </a:defRPr>
+            </a:pPr>
+            <a:r>
+              <a:t>GROUP BY user_id;</a:t>
             </a:r>
           </a:p>
         </p:txBody>
@@ -7288,71 +8617,14 @@
       </p:grpSpPr>
       <p:sp>
         <p:nvSpPr>
-          <p:cNvPr id="272" name="Shape 272"/>
-          <p:cNvSpPr/>
-          <p:nvPr>
-            <p:ph type="title"/>
-          </p:nvPr>
-        </p:nvSpPr>
-        <p:spPr>
-          <a:prstGeom prst="rect">
-            <a:avLst/>
-          </a:prstGeom>
-        </p:spPr>
-        <p:txBody>
-          <a:bodyPr/>
-          <a:lstStyle/>
-          <a:p>
-            <a:pPr defTabSz="467359">
-              <a:spcBef>
-                <a:spcPts val="2200"/>
-              </a:spcBef>
-              <a:defRPr sz="4800"/>
-            </a:pPr>
-          </a:p>
-        </p:txBody>
-      </p:sp>
-      <p:sp>
-        <p:nvSpPr>
-          <p:cNvPr id="273" name="Shape 273"/>
-          <p:cNvSpPr/>
-          <p:nvPr>
-            <p:ph type="body" idx="1"/>
-          </p:nvPr>
-        </p:nvSpPr>
-        <p:spPr>
-          <a:prstGeom prst="rect">
-            <a:avLst/>
-          </a:prstGeom>
-        </p:spPr>
-        <p:txBody>
-          <a:bodyPr/>
-          <a:lstStyle/>
-          <a:p>
-            <a:pPr/>
-          </a:p>
-        </p:txBody>
-      </p:sp>
-      <p:pic>
-        <p:nvPicPr>
-          <p:cNvPr id="274" name="pasted-image.jpeg"/>
-          <p:cNvPicPr>
-            <a:picLocks noChangeAspect="1"/>
-          </p:cNvPicPr>
+          <p:cNvPr id="302" name="Shape 302"/>
+          <p:cNvSpPr/>
           <p:nvPr/>
-        </p:nvPicPr>
-        <p:blipFill>
-          <a:blip r:embed="rId2">
-            <a:extLst/>
-          </a:blip>
-          <a:stretch>
-            <a:fillRect/>
-          </a:stretch>
-        </p:blipFill>
-        <p:spPr>
-          <a:xfrm>
-            <a:off x="386632" y="1275738"/>
-            <a:ext cx="12231536" cy="8154358"/>
+        </p:nvSpPr>
+        <p:spPr>
+          <a:xfrm>
+            <a:off x="406400" y="1721195"/>
+            <a:ext cx="12192001" cy="1169261"/>
           </a:xfrm>
           <a:prstGeom prst="rect">
             <a:avLst/>
@@ -7360,8 +8632,120 @@
           <a:ln w="12700">
             <a:miter lim="400000"/>
           </a:ln>
-        </p:spPr>
-      </p:pic>
+          <a:extLst>
+            <a:ext uri="{C572A759-6A51-4108-AA02-DFA0A04FC94B}">
+              <ma14:wrappingTextBoxFlag xmlns:ma14="http://schemas.microsoft.com/office/mac/drawingml/2011/main" val="1"/>
+            </a:ext>
+          </a:extLst>
+        </p:spPr>
+        <p:txBody>
+          <a:bodyPr lIns="50800" tIns="50800" rIns="50800" bIns="50800">
+            <a:normAutofit fontScale="100000" lnSpcReduction="0"/>
+          </a:bodyPr>
+          <a:lstStyle>
+            <a:lvl1pPr defTabSz="397256">
+              <a:lnSpc>
+                <a:spcPct val="80000"/>
+              </a:lnSpc>
+              <a:spcBef>
+                <a:spcPts val="1900"/>
+              </a:spcBef>
+              <a:defRPr cap="all" sz="8160">
+                <a:solidFill>
+                  <a:schemeClr val="accent1"/>
+                </a:solidFill>
+                <a:latin typeface="+mn-lt"/>
+                <a:ea typeface="+mn-ea"/>
+                <a:cs typeface="+mn-cs"/>
+                <a:sym typeface="DIN Condensed"/>
+              </a:defRPr>
+            </a:lvl1pPr>
+          </a:lstStyle>
+          <a:p>
+            <a:pPr/>
+            <a:r>
+              <a:t>Example #2: quantity per product</a:t>
+            </a:r>
+          </a:p>
+        </p:txBody>
+      </p:sp>
+      <p:sp>
+        <p:nvSpPr>
+          <p:cNvPr id="303" name="Shape 303"/>
+          <p:cNvSpPr/>
+          <p:nvPr/>
+        </p:nvSpPr>
+        <p:spPr>
+          <a:xfrm>
+            <a:off x="482599" y="4189728"/>
+            <a:ext cx="13854453" cy="3454401"/>
+          </a:xfrm>
+          <a:prstGeom prst="rect">
+            <a:avLst/>
+          </a:prstGeom>
+          <a:ln w="12700">
+            <a:miter lim="400000"/>
+          </a:ln>
+          <a:extLst>
+            <a:ext uri="{C572A759-6A51-4108-AA02-DFA0A04FC94B}">
+              <ma14:wrappingTextBoxFlag xmlns:ma14="http://schemas.microsoft.com/office/mac/drawingml/2011/main" val="1"/>
+            </a:ext>
+          </a:extLst>
+        </p:spPr>
+        <p:txBody>
+          <a:bodyPr lIns="50800" tIns="50800" rIns="50800" bIns="50800" anchor="ctr">
+            <a:spAutoFit/>
+          </a:bodyPr>
+          <a:lstStyle/>
+          <a:p>
+            <a:pPr>
+              <a:defRPr sz="6000">
+                <a:latin typeface="Anonymous Pro for Powerline"/>
+                <a:ea typeface="Anonymous Pro for Powerline"/>
+                <a:cs typeface="Anonymous Pro for Powerline"/>
+                <a:sym typeface="Anonymous Pro for Powerline"/>
+              </a:defRPr>
+            </a:pPr>
+            <a:r>
+              <a:t>SELECT user_id</a:t>
+            </a:r>
+            <a:r>
+              <a:rPr>
+                <a:solidFill>
+                  <a:schemeClr val="accent3"/>
+                </a:solidFill>
+              </a:rPr>
+              <a:t>, SUM(quantity)</a:t>
+            </a:r>
+          </a:p>
+          <a:p>
+            <a:pPr>
+              <a:defRPr sz="6000">
+                <a:latin typeface="Anonymous Pro for Powerline"/>
+                <a:ea typeface="Anonymous Pro for Powerline"/>
+                <a:cs typeface="Anonymous Pro for Powerline"/>
+                <a:sym typeface="Anonymous Pro for Powerline"/>
+              </a:defRPr>
+            </a:pPr>
+            <a:r>
+              <a:t>FROM purchases </a:t>
+            </a:r>
+          </a:p>
+          <a:p>
+            <a:pPr>
+              <a:defRPr sz="6000">
+                <a:latin typeface="Anonymous Pro for Powerline"/>
+                <a:ea typeface="Anonymous Pro for Powerline"/>
+                <a:cs typeface="Anonymous Pro for Powerline"/>
+                <a:sym typeface="Anonymous Pro for Powerline"/>
+              </a:defRPr>
+            </a:pPr>
+            <a:r>
+              <a:t>GROUP BY user_id;</a:t>
+            </a:r>
+          </a:p>
+        </p:txBody>
+      </p:sp>
     </p:spTree>
   </p:cSld>
   <p:clrMapOvr>
@@ -7388,124 +8772,18 @@
           <a:chExt cx="0" cy="0"/>
         </a:xfrm>
       </p:grpSpPr>
-      <p:pic>
-        <p:nvPicPr>
-          <p:cNvPr id="276" name="pasted-image.png"/>
-          <p:cNvPicPr>
-            <a:picLocks noChangeAspect="1"/>
-          </p:cNvPicPr>
-          <p:nvPr/>
-        </p:nvPicPr>
-        <p:blipFill>
-          <a:blip r:embed="rId2">
-            <a:extLst/>
-          </a:blip>
-          <a:stretch>
-            <a:fillRect/>
-          </a:stretch>
-        </p:blipFill>
-        <p:spPr>
-          <a:xfrm>
-            <a:off x="390924" y="5024566"/>
-            <a:ext cx="3646764" cy="3626616"/>
-          </a:xfrm>
-          <a:prstGeom prst="rect">
-            <a:avLst/>
-          </a:prstGeom>
-          <a:ln w="12700">
-            <a:miter lim="400000"/>
-          </a:ln>
-        </p:spPr>
-      </p:pic>
-      <p:pic>
-        <p:nvPicPr>
-          <p:cNvPr id="277" name="pasted-image.png"/>
-          <p:cNvPicPr>
-            <a:picLocks noChangeAspect="1"/>
-          </p:cNvPicPr>
-          <p:nvPr/>
-        </p:nvPicPr>
-        <p:blipFill>
-          <a:blip r:embed="rId3">
-            <a:extLst/>
-          </a:blip>
-          <a:stretch>
-            <a:fillRect/>
-          </a:stretch>
-        </p:blipFill>
-        <p:spPr>
-          <a:xfrm>
-            <a:off x="6879545" y="5304943"/>
-            <a:ext cx="5734331" cy="3224718"/>
-          </a:xfrm>
-          <a:prstGeom prst="rect">
-            <a:avLst/>
-          </a:prstGeom>
-          <a:ln w="12700">
-            <a:miter lim="400000"/>
-          </a:ln>
-        </p:spPr>
-      </p:pic>
-      <p:sp>
-        <p:nvSpPr>
-          <p:cNvPr id="278" name="Shape 278"/>
-          <p:cNvSpPr/>
-          <p:nvPr/>
-        </p:nvSpPr>
-        <p:spPr>
-          <a:xfrm>
-            <a:off x="3296936" y="6321458"/>
-            <a:ext cx="3361517" cy="751814"/>
-          </a:xfrm>
-          <a:prstGeom prst="rightArrow">
-            <a:avLst>
-              <a:gd name="adj1" fmla="val 32000"/>
-              <a:gd name="adj2" fmla="val 108112"/>
-            </a:avLst>
-          </a:prstGeom>
-          <a:solidFill>
-            <a:schemeClr val="accent1"/>
-          </a:solidFill>
-          <a:ln w="12700">
-            <a:miter lim="400000"/>
-          </a:ln>
-        </p:spPr>
-        <p:txBody>
-          <a:bodyPr lIns="50800" tIns="50800" rIns="50800" bIns="50800" anchor="ctr"/>
-          <a:lstStyle/>
-          <a:p>
-            <a:pPr algn="ctr">
-              <a:lnSpc>
-                <a:spcPct val="80000"/>
-              </a:lnSpc>
-              <a:spcBef>
-                <a:spcPts val="0"/>
-              </a:spcBef>
-              <a:defRPr cap="all" sz="2800">
-                <a:solidFill>
-                  <a:srgbClr val="FFFFFF"/>
-                </a:solidFill>
-                <a:latin typeface="+mn-lt"/>
-                <a:ea typeface="+mn-ea"/>
-                <a:cs typeface="+mn-cs"/>
-                <a:sym typeface="DIN Condensed"/>
-              </a:defRPr>
-            </a:pPr>
-          </a:p>
-        </p:txBody>
-      </p:sp>
-      <p:sp>
-        <p:nvSpPr>
-          <p:cNvPr id="279" name="Shape 279"/>
+      <p:sp>
+        <p:nvSpPr>
+          <p:cNvPr id="305" name="Shape 305"/>
           <p:cNvSpPr/>
           <p:nvPr>
-            <p:ph type="body" idx="1"/>
+            <p:ph type="title"/>
           </p:nvPr>
         </p:nvSpPr>
         <p:spPr>
           <a:xfrm>
-            <a:off x="406400" y="1137875"/>
-            <a:ext cx="12192000" cy="5476380"/>
+            <a:off x="2802102" y="4038600"/>
+            <a:ext cx="7400596" cy="4521200"/>
           </a:xfrm>
           <a:prstGeom prst="rect">
             <a:avLst/>
@@ -7515,31 +8793,9 @@
           <a:bodyPr/>
           <a:lstStyle/>
           <a:p>
-            <a:pPr marL="705970" indent="-705970">
-              <a:buClrTx/>
-              <a:buSzPct val="40000"/>
-              <a:buFontTx/>
-              <a:buBlip>
-                <a:blip r:embed="rId4"/>
-              </a:buBlip>
-              <a:defRPr sz="6400"/>
-            </a:pPr>
-            <a:r>
-              <a:t>Other columns can change</a:t>
-            </a:r>
-          </a:p>
-          <a:p>
-            <a:pPr marL="705970" indent="-705970">
-              <a:buClrTx/>
-              <a:buSzPct val="40000"/>
-              <a:buFontTx/>
-              <a:buBlip>
-                <a:blip r:embed="rId4"/>
-              </a:buBlip>
-              <a:defRPr sz="6400"/>
-            </a:pPr>
-            <a:r>
-              <a:t>We can still refer to the exact same row with primary key</a:t>
+            <a:pPr/>
+            <a:r>
+              <a:t>Exercises</a:t>
             </a:r>
           </a:p>
         </p:txBody>
@@ -7553,8 +8809,8 @@
 </p:sld>
 </file>
 
-<file path=ppt/slides/slide25.xml><?xml version="1.0" encoding="utf-8"?>
-<p:sld xmlns:a="http://schemas.openxmlformats.org/drawingml/2006/main" xmlns:r="http://schemas.openxmlformats.org/officeDocument/2006/relationships" xmlns:p="http://schemas.openxmlformats.org/presentationml/2006/main" showMasterSp="1" showMasterPhAnim="1">
+<file path=ppt/slides/slide3.xml><?xml version="1.0" encoding="utf-8"?>
+<p:sld xmlns:a="http://schemas.openxmlformats.org/drawingml/2006/main" xmlns:r="http://schemas.openxmlformats.org/officeDocument/2006/relationships" xmlns:p="http://schemas.openxmlformats.org/presentationml/2006/main" show="0" showMasterSp="1" showMasterPhAnim="1">
   <p:cSld>
     <p:spTree>
       <p:nvGrpSpPr>
@@ -7572,7 +8828,7 @@
       </p:grpSpPr>
       <p:sp>
         <p:nvSpPr>
-          <p:cNvPr id="281" name="Shape 281"/>
+          <p:cNvPr id="208" name="Shape 208"/>
           <p:cNvSpPr/>
           <p:nvPr>
             <p:ph type="title"/>
@@ -7580,8 +8836,8 @@
         </p:nvSpPr>
         <p:spPr>
           <a:xfrm>
-            <a:off x="406400" y="1536700"/>
-            <a:ext cx="12192000" cy="1169260"/>
+            <a:off x="406400" y="1651000"/>
+            <a:ext cx="12192000" cy="1574205"/>
           </a:xfrm>
           <a:prstGeom prst="rect">
             <a:avLst/>
@@ -7590,493 +8846,28 @@
         <p:txBody>
           <a:bodyPr/>
           <a:lstStyle>
-            <a:lvl1pPr defTabSz="403097">
-              <a:spcBef>
-                <a:spcPts val="1900"/>
-              </a:spcBef>
-              <a:defRPr sz="8280"/>
+            <a:lvl1pPr>
+              <a:defRPr sz="8000"/>
             </a:lvl1pPr>
           </a:lstStyle>
           <a:p>
             <a:pPr/>
             <a:r>
-              <a:t>Foreign key</a:t>
-            </a:r>
-          </a:p>
-        </p:txBody>
-      </p:sp>
-      <p:sp>
-        <p:nvSpPr>
-          <p:cNvPr id="282" name="Shape 282"/>
-          <p:cNvSpPr/>
-          <p:nvPr>
-            <p:ph type="body" idx="1"/>
-          </p:nvPr>
-        </p:nvSpPr>
-        <p:spPr>
-          <a:xfrm>
-            <a:off x="406400" y="3953767"/>
-            <a:ext cx="12192000" cy="5476380"/>
-          </a:xfrm>
-          <a:prstGeom prst="rect">
-            <a:avLst/>
-          </a:prstGeom>
-        </p:spPr>
-        <p:txBody>
-          <a:bodyPr/>
-          <a:lstStyle/>
-          <a:p>
-            <a:pPr marL="705970" indent="-705970">
-              <a:buClrTx/>
-              <a:buSzPct val="40000"/>
-              <a:buFontTx/>
-              <a:buBlip>
-                <a:blip r:embed="rId2"/>
-              </a:buBlip>
-              <a:defRPr sz="6400"/>
-            </a:pPr>
-            <a:r>
-              <a:t>Reference to primary key in different table</a:t>
-            </a:r>
-          </a:p>
-          <a:p>
-            <a:pPr marL="705970" indent="-705970">
-              <a:buClrTx/>
-              <a:buSzPct val="40000"/>
-              <a:buFontTx/>
-              <a:buBlip>
-                <a:blip r:embed="rId2"/>
-              </a:buBlip>
-              <a:defRPr sz="6400"/>
-            </a:pPr>
-            <a:r>
-              <a:t>Like a “link” to that row</a:t>
-            </a:r>
-          </a:p>
-        </p:txBody>
-      </p:sp>
-    </p:spTree>
-  </p:cSld>
-  <p:clrMapOvr>
-    <a:masterClrMapping/>
-  </p:clrMapOvr>
-  <p:transition xmlns:p14="http://schemas.microsoft.com/office/powerpoint/2010/main" spd="med" advClick="1"/>
-</p:sld>
-</file>
-
-<file path=ppt/slides/slide26.xml><?xml version="1.0" encoding="utf-8"?>
-<p:sld xmlns:a="http://schemas.openxmlformats.org/drawingml/2006/main" xmlns:r="http://schemas.openxmlformats.org/officeDocument/2006/relationships" xmlns:p="http://schemas.openxmlformats.org/presentationml/2006/main" showMasterSp="1" showMasterPhAnim="1">
-  <p:cSld>
-    <p:spTree>
-      <p:nvGrpSpPr>
-        <p:cNvPr id="1" name=""/>
-        <p:cNvGrpSpPr/>
-        <p:nvPr/>
-      </p:nvGrpSpPr>
-      <p:grpSpPr>
-        <a:xfrm>
-          <a:off x="0" y="0"/>
-          <a:ext cx="0" cy="0"/>
-          <a:chOff x="0" y="0"/>
-          <a:chExt cx="0" cy="0"/>
-        </a:xfrm>
-      </p:grpSpPr>
-      <p:sp>
-        <p:nvSpPr>
-          <p:cNvPr id="284" name="Shape 284"/>
-          <p:cNvSpPr/>
-          <p:nvPr>
-            <p:ph type="body" idx="13"/>
-          </p:nvPr>
-        </p:nvSpPr>
-        <p:spPr>
-          <a:prstGeom prst="rect">
-            <a:avLst/>
-          </a:prstGeom>
-        </p:spPr>
-        <p:txBody>
-          <a:bodyPr/>
-          <a:lstStyle/>
-          <a:p>
-            <a:pPr/>
-            <a:r>
-              <a:t>Text</a:t>
-            </a:r>
-          </a:p>
-        </p:txBody>
-      </p:sp>
-      <p:sp>
-        <p:nvSpPr>
-          <p:cNvPr id="285" name="Shape 285"/>
-          <p:cNvSpPr/>
-          <p:nvPr>
-            <p:ph type="title"/>
-          </p:nvPr>
-        </p:nvSpPr>
-        <p:spPr>
-          <a:prstGeom prst="rect">
-            <a:avLst/>
-          </a:prstGeom>
-        </p:spPr>
-        <p:txBody>
-          <a:bodyPr/>
-          <a:lstStyle/>
-          <a:p>
-            <a:pPr defTabSz="467359">
-              <a:spcBef>
-                <a:spcPts val="2200"/>
-              </a:spcBef>
-              <a:defRPr sz="4800"/>
-            </a:pPr>
-          </a:p>
-        </p:txBody>
-      </p:sp>
-      <p:sp>
-        <p:nvSpPr>
-          <p:cNvPr id="286" name="Shape 286"/>
-          <p:cNvSpPr/>
-          <p:nvPr>
-            <p:ph type="body" idx="1"/>
-          </p:nvPr>
-        </p:nvSpPr>
-        <p:spPr>
-          <a:prstGeom prst="rect">
-            <a:avLst/>
-          </a:prstGeom>
-        </p:spPr>
-        <p:txBody>
-          <a:bodyPr/>
-          <a:lstStyle/>
-          <a:p>
-            <a:pPr/>
-          </a:p>
-        </p:txBody>
-      </p:sp>
-      <p:pic>
-        <p:nvPicPr>
-          <p:cNvPr id="287" name="pasted-image.png"/>
-          <p:cNvPicPr>
-            <a:picLocks noChangeAspect="1"/>
-          </p:cNvPicPr>
+              <a:t>Select Statement with Limit</a:t>
+            </a:r>
+          </a:p>
+        </p:txBody>
+      </p:sp>
+      <p:sp>
+        <p:nvSpPr>
+          <p:cNvPr id="209" name="Shape 209"/>
+          <p:cNvSpPr/>
           <p:nvPr/>
-        </p:nvPicPr>
-        <p:blipFill>
-          <a:blip r:embed="rId2">
-            <a:extLst/>
-          </a:blip>
-          <a:stretch>
-            <a:fillRect/>
-          </a:stretch>
-        </p:blipFill>
-        <p:spPr>
-          <a:xfrm>
-            <a:off x="-39243" y="-1"/>
-            <a:ext cx="17894301" cy="9753601"/>
-          </a:xfrm>
-          <a:prstGeom prst="rect">
-            <a:avLst/>
-          </a:prstGeom>
-          <a:ln w="12700">
-            <a:miter lim="400000"/>
-          </a:ln>
-        </p:spPr>
-      </p:pic>
-    </p:spTree>
-  </p:cSld>
-  <p:clrMapOvr>
-    <a:masterClrMapping/>
-  </p:clrMapOvr>
-  <p:transition xmlns:p14="http://schemas.microsoft.com/office/powerpoint/2010/main" spd="med" advClick="1"/>
-</p:sld>
-</file>
-
-<file path=ppt/slides/slide27.xml><?xml version="1.0" encoding="utf-8"?>
-<p:sld xmlns:a="http://schemas.openxmlformats.org/drawingml/2006/main" xmlns:r="http://schemas.openxmlformats.org/officeDocument/2006/relationships" xmlns:p="http://schemas.openxmlformats.org/presentationml/2006/main" showMasterSp="1" showMasterPhAnim="1">
-  <p:cSld>
-    <p:spTree>
-      <p:nvGrpSpPr>
-        <p:cNvPr id="1" name=""/>
-        <p:cNvGrpSpPr/>
-        <p:nvPr/>
-      </p:nvGrpSpPr>
-      <p:grpSpPr>
-        <a:xfrm>
-          <a:off x="0" y="0"/>
-          <a:ext cx="0" cy="0"/>
-          <a:chOff x="0" y="0"/>
-          <a:chExt cx="0" cy="0"/>
-        </a:xfrm>
-      </p:grpSpPr>
-      <p:sp>
-        <p:nvSpPr>
-          <p:cNvPr id="289" name="Shape 289"/>
-          <p:cNvSpPr/>
-          <p:nvPr>
-            <p:ph type="body" idx="13"/>
-          </p:nvPr>
-        </p:nvSpPr>
-        <p:spPr>
-          <a:prstGeom prst="rect">
-            <a:avLst/>
-          </a:prstGeom>
-        </p:spPr>
-        <p:txBody>
-          <a:bodyPr/>
-          <a:lstStyle/>
-          <a:p>
-            <a:pPr/>
-            <a:r>
-              <a:t>Text</a:t>
-            </a:r>
-          </a:p>
-        </p:txBody>
-      </p:sp>
-      <p:sp>
-        <p:nvSpPr>
-          <p:cNvPr id="290" name="Shape 290"/>
-          <p:cNvSpPr/>
-          <p:nvPr>
-            <p:ph type="title"/>
-          </p:nvPr>
-        </p:nvSpPr>
-        <p:spPr>
-          <a:prstGeom prst="rect">
-            <a:avLst/>
-          </a:prstGeom>
-        </p:spPr>
-        <p:txBody>
-          <a:bodyPr/>
-          <a:lstStyle/>
-          <a:p>
-            <a:pPr defTabSz="467359">
-              <a:spcBef>
-                <a:spcPts val="2200"/>
-              </a:spcBef>
-              <a:defRPr sz="4800"/>
-            </a:pPr>
-          </a:p>
-        </p:txBody>
-      </p:sp>
-      <p:sp>
-        <p:nvSpPr>
-          <p:cNvPr id="291" name="Shape 291"/>
-          <p:cNvSpPr/>
-          <p:nvPr>
-            <p:ph type="body" idx="1"/>
-          </p:nvPr>
-        </p:nvSpPr>
-        <p:spPr>
-          <a:prstGeom prst="rect">
-            <a:avLst/>
-          </a:prstGeom>
-        </p:spPr>
-        <p:txBody>
-          <a:bodyPr/>
-          <a:lstStyle/>
-          <a:p>
-            <a:pPr/>
-          </a:p>
-        </p:txBody>
-      </p:sp>
-      <p:pic>
-        <p:nvPicPr>
-          <p:cNvPr id="292" name="pasted-image.png"/>
-          <p:cNvPicPr>
-            <a:picLocks noChangeAspect="1"/>
-          </p:cNvPicPr>
-          <p:nvPr/>
-        </p:nvPicPr>
-        <p:blipFill>
-          <a:blip r:embed="rId2">
-            <a:extLst/>
-          </a:blip>
-          <a:stretch>
-            <a:fillRect/>
-          </a:stretch>
-        </p:blipFill>
-        <p:spPr>
-          <a:xfrm>
-            <a:off x="-7440" y="-25400"/>
-            <a:ext cx="14325601" cy="9753600"/>
-          </a:xfrm>
-          <a:prstGeom prst="rect">
-            <a:avLst/>
-          </a:prstGeom>
-          <a:ln w="12700">
-            <a:miter lim="400000"/>
-          </a:ln>
-        </p:spPr>
-      </p:pic>
-    </p:spTree>
-  </p:cSld>
-  <p:clrMapOvr>
-    <a:masterClrMapping/>
-  </p:clrMapOvr>
-  <p:transition xmlns:p14="http://schemas.microsoft.com/office/powerpoint/2010/main" spd="med" advClick="1"/>
-</p:sld>
-</file>
-
-<file path=ppt/slides/slide28.xml><?xml version="1.0" encoding="utf-8"?>
-<p:sld xmlns:a="http://schemas.openxmlformats.org/drawingml/2006/main" xmlns:r="http://schemas.openxmlformats.org/officeDocument/2006/relationships" xmlns:p="http://schemas.openxmlformats.org/presentationml/2006/main" showMasterSp="1" showMasterPhAnim="1">
-  <p:cSld>
-    <p:spTree>
-      <p:nvGrpSpPr>
-        <p:cNvPr id="1" name=""/>
-        <p:cNvGrpSpPr/>
-        <p:nvPr/>
-      </p:nvGrpSpPr>
-      <p:grpSpPr>
-        <a:xfrm>
-          <a:off x="0" y="0"/>
-          <a:ext cx="0" cy="0"/>
-          <a:chOff x="0" y="0"/>
-          <a:chExt cx="0" cy="0"/>
-        </a:xfrm>
-      </p:grpSpPr>
-      <p:sp>
-        <p:nvSpPr>
-          <p:cNvPr id="294" name="Shape 294"/>
-          <p:cNvSpPr/>
-          <p:nvPr>
-            <p:ph type="title"/>
-          </p:nvPr>
-        </p:nvSpPr>
-        <p:spPr>
-          <a:xfrm>
-            <a:off x="406400" y="1536700"/>
-            <a:ext cx="12192000" cy="1169260"/>
-          </a:xfrm>
-          <a:prstGeom prst="rect">
-            <a:avLst/>
-          </a:prstGeom>
-        </p:spPr>
-        <p:txBody>
-          <a:bodyPr/>
-          <a:lstStyle>
-            <a:lvl1pPr defTabSz="403097">
-              <a:spcBef>
-                <a:spcPts val="1900"/>
-              </a:spcBef>
-              <a:defRPr sz="8280"/>
-            </a:lvl1pPr>
-          </a:lstStyle>
-          <a:p>
-            <a:pPr/>
-            <a:r>
-              <a:t>Question #1</a:t>
-            </a:r>
-          </a:p>
-        </p:txBody>
-      </p:sp>
-      <p:sp>
-        <p:nvSpPr>
-          <p:cNvPr id="295" name="Shape 295"/>
-          <p:cNvSpPr/>
-          <p:nvPr>
-            <p:ph type="body" idx="1"/>
-          </p:nvPr>
-        </p:nvSpPr>
-        <p:spPr>
-          <a:xfrm>
-            <a:off x="406400" y="3236537"/>
-            <a:ext cx="12192000" cy="5476380"/>
-          </a:xfrm>
-          <a:prstGeom prst="rect">
-            <a:avLst/>
-          </a:prstGeom>
-        </p:spPr>
-        <p:txBody>
-          <a:bodyPr/>
-          <a:lstStyle>
-            <a:lvl1pPr marL="705970" indent="-705970">
-              <a:buClrTx/>
-              <a:buSzPct val="40000"/>
-              <a:buFontTx/>
-              <a:buBlip>
-                <a:blip r:embed="rId2"/>
-              </a:buBlip>
-              <a:defRPr sz="6400"/>
-            </a:lvl1pPr>
-          </a:lstStyle>
-          <a:p>
-            <a:pPr/>
-            <a:r>
-              <a:t>What e-mail address is associated with the latest purchase from Wyoming?</a:t>
-            </a:r>
-          </a:p>
-        </p:txBody>
-      </p:sp>
-    </p:spTree>
-  </p:cSld>
-  <p:clrMapOvr>
-    <a:masterClrMapping/>
-  </p:clrMapOvr>
-  <p:transition xmlns:p14="http://schemas.microsoft.com/office/powerpoint/2010/main" spd="med" advClick="1"/>
-</p:sld>
-</file>
-
-<file path=ppt/slides/slide29.xml><?xml version="1.0" encoding="utf-8"?>
-<p:sld xmlns:a="http://schemas.openxmlformats.org/drawingml/2006/main" xmlns:r="http://schemas.openxmlformats.org/officeDocument/2006/relationships" xmlns:p="http://schemas.openxmlformats.org/presentationml/2006/main" showMasterSp="1" showMasterPhAnim="1">
-  <p:cSld>
-    <p:spTree>
-      <p:nvGrpSpPr>
-        <p:cNvPr id="1" name=""/>
-        <p:cNvGrpSpPr/>
-        <p:nvPr/>
-      </p:nvGrpSpPr>
-      <p:grpSpPr>
-        <a:xfrm>
-          <a:off x="0" y="0"/>
-          <a:ext cx="0" cy="0"/>
-          <a:chOff x="0" y="0"/>
-          <a:chExt cx="0" cy="0"/>
-        </a:xfrm>
-      </p:grpSpPr>
-      <p:sp>
-        <p:nvSpPr>
-          <p:cNvPr id="297" name="Shape 297"/>
-          <p:cNvSpPr/>
-          <p:nvPr>
-            <p:ph type="title"/>
-          </p:nvPr>
-        </p:nvSpPr>
-        <p:spPr>
-          <a:xfrm>
-            <a:off x="406400" y="1536700"/>
-            <a:ext cx="12192000" cy="1169260"/>
-          </a:xfrm>
-          <a:prstGeom prst="rect">
-            <a:avLst/>
-          </a:prstGeom>
-        </p:spPr>
-        <p:txBody>
-          <a:bodyPr/>
-          <a:lstStyle>
-            <a:lvl1pPr defTabSz="403097">
-              <a:spcBef>
-                <a:spcPts val="1900"/>
-              </a:spcBef>
-              <a:defRPr sz="8280"/>
-            </a:lvl1pPr>
-          </a:lstStyle>
-          <a:p>
-            <a:pPr/>
-            <a:r>
-              <a:t>Question #2</a:t>
-            </a:r>
-          </a:p>
-        </p:txBody>
-      </p:sp>
-      <p:sp>
-        <p:nvSpPr>
-          <p:cNvPr id="298" name="Shape 298"/>
-          <p:cNvSpPr/>
-          <p:nvPr/>
-        </p:nvSpPr>
-        <p:spPr>
-          <a:xfrm>
-            <a:off x="443915" y="3630765"/>
-            <a:ext cx="12116969" cy="4876801"/>
+        </p:nvSpPr>
+        <p:spPr>
+          <a:xfrm>
+            <a:off x="462014" y="3898900"/>
+            <a:ext cx="11795102" cy="1955801"/>
           </a:xfrm>
           <a:prstGeom prst="rect">
             <a:avLst/>
@@ -8096,124 +8887,6 @@
           </a:bodyPr>
           <a:lstStyle/>
           <a:p>
-            <a:pPr marL="705970" indent="-705970">
-              <a:spcBef>
-                <a:spcPts val="2800"/>
-              </a:spcBef>
-              <a:buSzPct val="40000"/>
-              <a:buBlip>
-                <a:blip r:embed="rId2"/>
-              </a:buBlip>
-              <a:defRPr sz="6400"/>
-            </a:pPr>
-            <a:r>
-              <a:t>The largest order from purchase_items was for what product?</a:t>
-            </a:r>
-          </a:p>
-          <a:p>
-            <a:pPr marL="705970" indent="-705970">
-              <a:spcBef>
-                <a:spcPts val="2800"/>
-              </a:spcBef>
-              <a:buSzPct val="40000"/>
-              <a:buBlip>
-                <a:blip r:embed="rId2"/>
-              </a:buBlip>
-              <a:defRPr sz="6400"/>
-            </a:pPr>
-            <a:r>
-              <a:t>Use both price and quantity</a:t>
-            </a:r>
-          </a:p>
-        </p:txBody>
-      </p:sp>
-    </p:spTree>
-  </p:cSld>
-  <p:clrMapOvr>
-    <a:masterClrMapping/>
-  </p:clrMapOvr>
-  <p:transition xmlns:p14="http://schemas.microsoft.com/office/powerpoint/2010/main" spd="med" advClick="1"/>
-</p:sld>
-</file>
-
-<file path=ppt/slides/slide3.xml><?xml version="1.0" encoding="utf-8"?>
-<p:sld xmlns:a="http://schemas.openxmlformats.org/drawingml/2006/main" xmlns:r="http://schemas.openxmlformats.org/officeDocument/2006/relationships" xmlns:p="http://schemas.openxmlformats.org/presentationml/2006/main" showMasterSp="1" showMasterPhAnim="1">
-  <p:cSld>
-    <p:spTree>
-      <p:nvGrpSpPr>
-        <p:cNvPr id="1" name=""/>
-        <p:cNvGrpSpPr/>
-        <p:nvPr/>
-      </p:nvGrpSpPr>
-      <p:grpSpPr>
-        <a:xfrm>
-          <a:off x="0" y="0"/>
-          <a:ext cx="0" cy="0"/>
-          <a:chOff x="0" y="0"/>
-          <a:chExt cx="0" cy="0"/>
-        </a:xfrm>
-      </p:grpSpPr>
-      <p:sp>
-        <p:nvSpPr>
-          <p:cNvPr id="208" name="Shape 208"/>
-          <p:cNvSpPr/>
-          <p:nvPr>
-            <p:ph type="title"/>
-          </p:nvPr>
-        </p:nvSpPr>
-        <p:spPr>
-          <a:xfrm>
-            <a:off x="406400" y="1651000"/>
-            <a:ext cx="12192000" cy="1574205"/>
-          </a:xfrm>
-          <a:prstGeom prst="rect">
-            <a:avLst/>
-          </a:prstGeom>
-        </p:spPr>
-        <p:txBody>
-          <a:bodyPr/>
-          <a:lstStyle>
-            <a:lvl1pPr>
-              <a:defRPr sz="8000"/>
-            </a:lvl1pPr>
-          </a:lstStyle>
-          <a:p>
-            <a:pPr/>
-            <a:r>
-              <a:t>Select Statement with Limit</a:t>
-            </a:r>
-          </a:p>
-        </p:txBody>
-      </p:sp>
-      <p:sp>
-        <p:nvSpPr>
-          <p:cNvPr id="209" name="Shape 209"/>
-          <p:cNvSpPr/>
-          <p:nvPr/>
-        </p:nvSpPr>
-        <p:spPr>
-          <a:xfrm>
-            <a:off x="462014" y="3898900"/>
-            <a:ext cx="11795102" cy="1955801"/>
-          </a:xfrm>
-          <a:prstGeom prst="rect">
-            <a:avLst/>
-          </a:prstGeom>
-          <a:ln w="12700">
-            <a:miter lim="400000"/>
-          </a:ln>
-          <a:extLst>
-            <a:ext uri="{C572A759-6A51-4108-AA02-DFA0A04FC94B}">
-              <ma14:wrappingTextBoxFlag xmlns:ma14="http://schemas.microsoft.com/office/mac/drawingml/2011/main" val="1"/>
-            </a:ext>
-          </a:extLst>
-        </p:spPr>
-        <p:txBody>
-          <a:bodyPr lIns="50800" tIns="50800" rIns="50800" bIns="50800" anchor="ctr">
-            <a:spAutoFit/>
-          </a:bodyPr>
-          <a:lstStyle/>
-          <a:p>
             <a:pPr>
               <a:defRPr sz="5100">
                 <a:latin typeface="Anonymous Pro for Powerline"/>
@@ -8237,127 +8910,6 @@
             </a:pPr>
             <a:r>
               <a:t>LIMIT 100;</a:t>
-            </a:r>
-          </a:p>
-        </p:txBody>
-      </p:sp>
-    </p:spTree>
-  </p:cSld>
-  <p:clrMapOvr>
-    <a:masterClrMapping/>
-  </p:clrMapOvr>
-  <p:transition xmlns:p14="http://schemas.microsoft.com/office/powerpoint/2010/main" spd="med" advClick="1"/>
-</p:sld>
-</file>
-
-<file path=ppt/slides/slide30.xml><?xml version="1.0" encoding="utf-8"?>
-<p:sld xmlns:a="http://schemas.openxmlformats.org/drawingml/2006/main" xmlns:r="http://schemas.openxmlformats.org/officeDocument/2006/relationships" xmlns:p="http://schemas.openxmlformats.org/presentationml/2006/main" showMasterSp="1" showMasterPhAnim="1">
-  <p:cSld>
-    <p:spTree>
-      <p:nvGrpSpPr>
-        <p:cNvPr id="1" name=""/>
-        <p:cNvGrpSpPr/>
-        <p:nvPr/>
-      </p:nvGrpSpPr>
-      <p:grpSpPr>
-        <a:xfrm>
-          <a:off x="0" y="0"/>
-          <a:ext cx="0" cy="0"/>
-          <a:chOff x="0" y="0"/>
-          <a:chExt cx="0" cy="0"/>
-        </a:xfrm>
-      </p:grpSpPr>
-      <p:sp>
-        <p:nvSpPr>
-          <p:cNvPr id="300" name="Shape 300"/>
-          <p:cNvSpPr/>
-          <p:nvPr>
-            <p:ph type="title"/>
-          </p:nvPr>
-        </p:nvSpPr>
-        <p:spPr>
-          <a:xfrm>
-            <a:off x="406400" y="1536700"/>
-            <a:ext cx="12192000" cy="1169260"/>
-          </a:xfrm>
-          <a:prstGeom prst="rect">
-            <a:avLst/>
-          </a:prstGeom>
-        </p:spPr>
-        <p:txBody>
-          <a:bodyPr/>
-          <a:lstStyle>
-            <a:lvl1pPr defTabSz="403097">
-              <a:spcBef>
-                <a:spcPts val="1900"/>
-              </a:spcBef>
-              <a:defRPr sz="8280"/>
-            </a:lvl1pPr>
-          </a:lstStyle>
-          <a:p>
-            <a:pPr/>
-            <a:r>
-              <a:t>Question #3</a:t>
-            </a:r>
-          </a:p>
-        </p:txBody>
-      </p:sp>
-      <p:sp>
-        <p:nvSpPr>
-          <p:cNvPr id="301" name="Shape 301"/>
-          <p:cNvSpPr/>
-          <p:nvPr/>
-        </p:nvSpPr>
-        <p:spPr>
-          <a:xfrm>
-            <a:off x="443915" y="3630765"/>
-            <a:ext cx="12116969" cy="4876801"/>
-          </a:xfrm>
-          <a:prstGeom prst="rect">
-            <a:avLst/>
-          </a:prstGeom>
-          <a:ln w="12700">
-            <a:miter lim="400000"/>
-          </a:ln>
-          <a:extLst>
-            <a:ext uri="{C572A759-6A51-4108-AA02-DFA0A04FC94B}">
-              <ma14:wrappingTextBoxFlag xmlns:ma14="http://schemas.microsoft.com/office/mac/drawingml/2011/main" val="1"/>
-            </a:ext>
-          </a:extLst>
-        </p:spPr>
-        <p:txBody>
-          <a:bodyPr lIns="50800" tIns="50800" rIns="50800" bIns="50800" anchor="ctr">
-            <a:spAutoFit/>
-          </a:bodyPr>
-          <a:lstStyle/>
-          <a:p>
-            <a:pPr marL="705970" indent="-705970">
-              <a:spcBef>
-                <a:spcPts val="2800"/>
-              </a:spcBef>
-              <a:buSzPct val="40000"/>
-              <a:buBlip>
-                <a:blip r:embed="rId2"/>
-              </a:buBlip>
-              <a:defRPr sz="6400"/>
-            </a:pPr>
-            <a:r>
-              <a:t>What is the name of the person who made the largest return?</a:t>
-            </a:r>
-          </a:p>
-          <a:p>
-            <a:pPr marL="705970" indent="-705970">
-              <a:spcBef>
-                <a:spcPts val="2800"/>
-              </a:spcBef>
-              <a:buSzPct val="40000"/>
-              <a:buBlip>
-                <a:blip r:embed="rId2"/>
-              </a:buBlip>
-              <a:defRPr sz="6400"/>
-            </a:pPr>
-            <a:r>
-              <a:t>Use both price and quantity</a:t>
             </a:r>
           </a:p>
         </p:txBody>

</xml_diff>